<commit_message>
Clean up on Sec 2.2, 2.3.
</commit_message>
<xml_diff>
--- a/monitoring_wcet/figs_src/diagrams-narrow.pptx
+++ b/monitoring_wcet/figs_src/diagrams-narrow.pptx
@@ -9,6 +9,9 @@
     <p:sldId id="257" r:id="rId3"/>
     <p:sldId id="258" r:id="rId4"/>
     <p:sldId id="259" r:id="rId5"/>
+    <p:sldId id="260" r:id="rId6"/>
+    <p:sldId id="261" r:id="rId7"/>
+    <p:sldId id="262" r:id="rId8"/>
   </p:sldIdLst>
   <p:sldSz cx="2651125" cy="10058400"/>
   <p:notesSz cx="2192338" cy="9601200"/>
@@ -291,7 +294,7 @@
           <a:p>
             <a:fld id="{D888532C-1FCB-40DB-A177-17AD6E59D507}" type="datetimeFigureOut">
               <a:rPr lang="en-US" smtClean="0"/>
-              <a:t>1/21/2015</a:t>
+              <a:t>2/17/2015</a:t>
             </a:fld>
             <a:endParaRPr lang="en-US"/>
           </a:p>
@@ -461,7 +464,7 @@
           <a:p>
             <a:fld id="{D888532C-1FCB-40DB-A177-17AD6E59D507}" type="datetimeFigureOut">
               <a:rPr lang="en-US" smtClean="0"/>
-              <a:t>1/21/2015</a:t>
+              <a:t>2/17/2015</a:t>
             </a:fld>
             <a:endParaRPr lang="en-US"/>
           </a:p>
@@ -641,7 +644,7 @@
           <a:p>
             <a:fld id="{D888532C-1FCB-40DB-A177-17AD6E59D507}" type="datetimeFigureOut">
               <a:rPr lang="en-US" smtClean="0"/>
-              <a:t>1/21/2015</a:t>
+              <a:t>2/17/2015</a:t>
             </a:fld>
             <a:endParaRPr lang="en-US"/>
           </a:p>
@@ -811,7 +814,7 @@
           <a:p>
             <a:fld id="{D888532C-1FCB-40DB-A177-17AD6E59D507}" type="datetimeFigureOut">
               <a:rPr lang="en-US" smtClean="0"/>
-              <a:t>1/21/2015</a:t>
+              <a:t>2/17/2015</a:t>
             </a:fld>
             <a:endParaRPr lang="en-US"/>
           </a:p>
@@ -1057,7 +1060,7 @@
           <a:p>
             <a:fld id="{D888532C-1FCB-40DB-A177-17AD6E59D507}" type="datetimeFigureOut">
               <a:rPr lang="en-US" smtClean="0"/>
-              <a:t>1/21/2015</a:t>
+              <a:t>2/17/2015</a:t>
             </a:fld>
             <a:endParaRPr lang="en-US"/>
           </a:p>
@@ -1345,7 +1348,7 @@
           <a:p>
             <a:fld id="{D888532C-1FCB-40DB-A177-17AD6E59D507}" type="datetimeFigureOut">
               <a:rPr lang="en-US" smtClean="0"/>
-              <a:t>1/21/2015</a:t>
+              <a:t>2/17/2015</a:t>
             </a:fld>
             <a:endParaRPr lang="en-US"/>
           </a:p>
@@ -1772,7 +1775,7 @@
           <a:p>
             <a:fld id="{D888532C-1FCB-40DB-A177-17AD6E59D507}" type="datetimeFigureOut">
               <a:rPr lang="en-US" smtClean="0"/>
-              <a:t>1/21/2015</a:t>
+              <a:t>2/17/2015</a:t>
             </a:fld>
             <a:endParaRPr lang="en-US"/>
           </a:p>
@@ -1890,7 +1893,7 @@
           <a:p>
             <a:fld id="{D888532C-1FCB-40DB-A177-17AD6E59D507}" type="datetimeFigureOut">
               <a:rPr lang="en-US" smtClean="0"/>
-              <a:t>1/21/2015</a:t>
+              <a:t>2/17/2015</a:t>
             </a:fld>
             <a:endParaRPr lang="en-US"/>
           </a:p>
@@ -1985,7 +1988,7 @@
           <a:p>
             <a:fld id="{D888532C-1FCB-40DB-A177-17AD6E59D507}" type="datetimeFigureOut">
               <a:rPr lang="en-US" smtClean="0"/>
-              <a:t>1/21/2015</a:t>
+              <a:t>2/17/2015</a:t>
             </a:fld>
             <a:endParaRPr lang="en-US"/>
           </a:p>
@@ -2262,7 +2265,7 @@
           <a:p>
             <a:fld id="{D888532C-1FCB-40DB-A177-17AD6E59D507}" type="datetimeFigureOut">
               <a:rPr lang="en-US" smtClean="0"/>
-              <a:t>1/21/2015</a:t>
+              <a:t>2/17/2015</a:t>
             </a:fld>
             <a:endParaRPr lang="en-US"/>
           </a:p>
@@ -2515,7 +2518,7 @@
           <a:p>
             <a:fld id="{D888532C-1FCB-40DB-A177-17AD6E59D507}" type="datetimeFigureOut">
               <a:rPr lang="en-US" smtClean="0"/>
-              <a:t>1/21/2015</a:t>
+              <a:t>2/17/2015</a:t>
             </a:fld>
             <a:endParaRPr lang="en-US"/>
           </a:p>
@@ -2728,7 +2731,7 @@
           <a:p>
             <a:fld id="{D888532C-1FCB-40DB-A177-17AD6E59D507}" type="datetimeFigureOut">
               <a:rPr lang="en-US" smtClean="0"/>
-              <a:t>1/21/2015</a:t>
+              <a:t>2/17/2015</a:t>
             </a:fld>
             <a:endParaRPr lang="en-US"/>
           </a:p>
@@ -5149,8 +5152,25 @@
                 <a:latin typeface="Arial" pitchFamily="34" charset="0"/>
                 <a:cs typeface="Arial" pitchFamily="34" charset="0"/>
               </a:rPr>
-              <a:t>lo_0</a:t>
-            </a:r>
+              <a:t>lo</a:t>
+            </a:r>
+            <a:r>
+              <a:rPr lang="en-US" sz="800" baseline="-25000" dirty="0">
+                <a:solidFill>
+                  <a:schemeClr val="tx1"/>
+                </a:solidFill>
+                <a:latin typeface="Arial" pitchFamily="34" charset="0"/>
+                <a:cs typeface="Arial" pitchFamily="34" charset="0"/>
+              </a:rPr>
+              <a:t>0</a:t>
+            </a:r>
+            <a:endParaRPr lang="en-US" sz="800" dirty="0" smtClean="0">
+              <a:solidFill>
+                <a:schemeClr val="tx1"/>
+              </a:solidFill>
+              <a:latin typeface="Arial" pitchFamily="34" charset="0"/>
+              <a:cs typeface="Arial" pitchFamily="34" charset="0"/>
+            </a:endParaRPr>
           </a:p>
         </p:txBody>
       </p:sp>
@@ -5202,8 +5222,25 @@
                 <a:latin typeface="Arial" pitchFamily="34" charset="0"/>
                 <a:cs typeface="Arial" pitchFamily="34" charset="0"/>
               </a:rPr>
-              <a:t>lo_1</a:t>
-            </a:r>
+              <a:t>lo</a:t>
+            </a:r>
+            <a:r>
+              <a:rPr lang="en-US" sz="800" baseline="-25000" dirty="0" smtClean="0">
+                <a:solidFill>
+                  <a:schemeClr val="tx1"/>
+                </a:solidFill>
+                <a:latin typeface="Arial" pitchFamily="34" charset="0"/>
+                <a:cs typeface="Arial" pitchFamily="34" charset="0"/>
+              </a:rPr>
+              <a:t>1</a:t>
+            </a:r>
+            <a:endParaRPr lang="en-US" sz="800" dirty="0" smtClean="0">
+              <a:solidFill>
+                <a:schemeClr val="tx1"/>
+              </a:solidFill>
+              <a:latin typeface="Arial" pitchFamily="34" charset="0"/>
+              <a:cs typeface="Arial" pitchFamily="34" charset="0"/>
+            </a:endParaRPr>
           </a:p>
         </p:txBody>
       </p:sp>
@@ -5308,7 +5345,17 @@
                 <a:latin typeface="Arial" pitchFamily="34" charset="0"/>
                 <a:cs typeface="Arial" pitchFamily="34" charset="0"/>
               </a:rPr>
-              <a:t>lo_M</a:t>
+              <a:t>lo</a:t>
+            </a:r>
+            <a:r>
+              <a:rPr lang="en-US" sz="800" baseline="-25000" dirty="0" err="1" smtClean="0">
+                <a:solidFill>
+                  <a:schemeClr val="tx1"/>
+                </a:solidFill>
+                <a:latin typeface="Arial" pitchFamily="34" charset="0"/>
+                <a:cs typeface="Arial" pitchFamily="34" charset="0"/>
+              </a:rPr>
+              <a:t>N</a:t>
             </a:r>
             <a:endParaRPr lang="en-US" sz="800" dirty="0" smtClean="0">
               <a:solidFill>
@@ -5541,8 +5588,8 @@
         </p:nvSpPr>
         <p:spPr>
           <a:xfrm>
-            <a:off x="252015" y="898801"/>
-            <a:ext cx="609600" cy="146851"/>
+            <a:off x="366712" y="898801"/>
+            <a:ext cx="425451" cy="146851"/>
           </a:xfrm>
           <a:prstGeom prst="rect">
             <a:avLst/>
@@ -5581,9 +5628,19 @@
                 <a:latin typeface="Arial" pitchFamily="34" charset="0"/>
                 <a:cs typeface="Arial" pitchFamily="34" charset="0"/>
               </a:rPr>
-              <a:t>c_M,min</a:t>
-            </a:r>
-            <a:endParaRPr lang="en-US" sz="800" dirty="0" smtClean="0">
+              <a:t>c</a:t>
+            </a:r>
+            <a:r>
+              <a:rPr lang="en-US" sz="800" baseline="-25000" dirty="0" err="1" smtClean="0">
+                <a:solidFill>
+                  <a:schemeClr val="tx1"/>
+                </a:solidFill>
+                <a:latin typeface="Arial" pitchFamily="34" charset="0"/>
+                <a:cs typeface="Arial" pitchFamily="34" charset="0"/>
+              </a:rPr>
+              <a:t>M,min</a:t>
+            </a:r>
+            <a:endParaRPr lang="en-US" sz="800" baseline="-25000" dirty="0" smtClean="0">
               <a:solidFill>
                 <a:schemeClr val="tx1"/>
               </a:solidFill>
@@ -5748,8 +5805,8 @@
         </p:nvSpPr>
         <p:spPr>
           <a:xfrm>
-            <a:off x="106362" y="2053523"/>
-            <a:ext cx="609600" cy="146851"/>
+            <a:off x="218955" y="2053523"/>
+            <a:ext cx="473075" cy="146851"/>
           </a:xfrm>
           <a:prstGeom prst="rect">
             <a:avLst/>
@@ -5788,9 +5845,19 @@
                 <a:latin typeface="Arial" pitchFamily="34" charset="0"/>
                 <a:cs typeface="Arial" pitchFamily="34" charset="0"/>
               </a:rPr>
-              <a:t>t_M,max</a:t>
-            </a:r>
-            <a:endParaRPr lang="en-US" sz="800" dirty="0" smtClean="0">
+              <a:t>t</a:t>
+            </a:r>
+            <a:r>
+              <a:rPr lang="en-US" sz="800" baseline="-25000" dirty="0" err="1" smtClean="0">
+                <a:solidFill>
+                  <a:schemeClr val="tx1"/>
+                </a:solidFill>
+                <a:latin typeface="Arial" pitchFamily="34" charset="0"/>
+                <a:cs typeface="Arial" pitchFamily="34" charset="0"/>
+              </a:rPr>
+              <a:t>M,max</a:t>
+            </a:r>
+            <a:endParaRPr lang="en-US" sz="800" baseline="-25000" dirty="0" smtClean="0">
               <a:solidFill>
                 <a:schemeClr val="tx1"/>
               </a:solidFill>
@@ -6011,8 +6078,8 @@
         </p:nvSpPr>
         <p:spPr>
           <a:xfrm>
-            <a:off x="444500" y="2505545"/>
-            <a:ext cx="804862" cy="146851"/>
+            <a:off x="563562" y="2505545"/>
+            <a:ext cx="692149" cy="146851"/>
           </a:xfrm>
           <a:prstGeom prst="rect">
             <a:avLst/>
@@ -6044,24 +6111,74 @@
           <a:p>
             <a:pPr algn="ctr"/>
             <a:r>
-              <a:rPr lang="en-US" sz="800" dirty="0" smtClean="0">
+              <a:rPr lang="en-US" sz="800" dirty="0" err="1" smtClean="0">
                 <a:solidFill>
                   <a:schemeClr val="tx1"/>
                 </a:solidFill>
                 <a:latin typeface="Arial" pitchFamily="34" charset="0"/>
                 <a:cs typeface="Arial" pitchFamily="34" charset="0"/>
               </a:rPr>
-              <a:t>li + delta </a:t>
-            </a:r>
-            <a:r>
-              <a:rPr lang="en-US" sz="800" dirty="0" err="1" smtClean="0">
+              <a:t>li</a:t>
+            </a:r>
+            <a:r>
+              <a:rPr lang="en-US" sz="800" baseline="-25000" dirty="0" err="1" smtClean="0">
                 <a:solidFill>
                   <a:schemeClr val="tx1"/>
                 </a:solidFill>
                 <a:latin typeface="Arial" pitchFamily="34" charset="0"/>
                 <a:cs typeface="Arial" pitchFamily="34" charset="0"/>
               </a:rPr>
-              <a:t>l_M</a:t>
+              <a:t>M</a:t>
+            </a:r>
+            <a:r>
+              <a:rPr lang="en-US" sz="800" dirty="0" smtClean="0">
+                <a:solidFill>
+                  <a:schemeClr val="tx1"/>
+                </a:solidFill>
+                <a:latin typeface="Arial" pitchFamily="34" charset="0"/>
+                <a:cs typeface="Arial" pitchFamily="34" charset="0"/>
+              </a:rPr>
+              <a:t> </a:t>
+            </a:r>
+            <a:r>
+              <a:rPr lang="en-US" sz="800" dirty="0" smtClean="0">
+                <a:solidFill>
+                  <a:schemeClr val="tx1"/>
+                </a:solidFill>
+                <a:latin typeface="Arial" pitchFamily="34" charset="0"/>
+                <a:cs typeface="Arial" pitchFamily="34" charset="0"/>
+              </a:rPr>
+              <a:t>+ </a:t>
+            </a:r>
+            <a:r>
+              <a:rPr lang="en-US" sz="800" dirty="0">
+                <a:solidFill>
+                  <a:schemeClr val="tx1"/>
+                </a:solidFill>
+                <a:latin typeface="Arial" pitchFamily="34" charset="0"/>
+                <a:cs typeface="Arial" pitchFamily="34" charset="0"/>
+              </a:rPr>
+              <a:t>∆</a:t>
+            </a:r>
+            <a:r>
+              <a:rPr lang="en-US" sz="800" dirty="0" err="1" smtClean="0">
+                <a:solidFill>
+                  <a:schemeClr val="tx1"/>
+                </a:solidFill>
+                <a:latin typeface="Arial" pitchFamily="34" charset="0"/>
+                <a:cs typeface="Arial" pitchFamily="34" charset="0"/>
+              </a:rPr>
+              <a:t>l</a:t>
+            </a:r>
+            <a:r>
+              <a:rPr lang="en-US" sz="800" baseline="-25000" dirty="0" err="1" smtClean="0">
+                <a:solidFill>
+                  <a:schemeClr val="tx1"/>
+                </a:solidFill>
+                <a:latin typeface="Arial" pitchFamily="34" charset="0"/>
+                <a:cs typeface="Arial" pitchFamily="34" charset="0"/>
+              </a:rPr>
+              <a:t>M</a:t>
             </a:r>
             <a:endParaRPr lang="en-US" sz="800" dirty="0" smtClean="0">
               <a:solidFill>
@@ -6314,7 +6431,7 @@
         </p:nvSpPr>
         <p:spPr>
           <a:xfrm>
-            <a:off x="1140222" y="3680288"/>
+            <a:off x="1152923" y="3680286"/>
             <a:ext cx="337740" cy="146851"/>
           </a:xfrm>
           <a:prstGeom prst="rect">
@@ -6347,7 +6464,7 @@
           <a:p>
             <a:pPr algn="ctr"/>
             <a:r>
-              <a:rPr lang="en-US" sz="800" dirty="0" smtClean="0">
+              <a:rPr lang="en-US" sz="800" dirty="0" err="1" smtClean="0">
                 <a:solidFill>
                   <a:schemeClr val="tx1"/>
                 </a:solidFill>
@@ -6356,6 +6473,23 @@
               </a:rPr>
               <a:t>lo</a:t>
             </a:r>
+            <a:r>
+              <a:rPr lang="en-US" sz="800" baseline="-25000" dirty="0" err="1" smtClean="0">
+                <a:solidFill>
+                  <a:schemeClr val="tx1"/>
+                </a:solidFill>
+                <a:latin typeface="Arial" pitchFamily="34" charset="0"/>
+                <a:cs typeface="Arial" pitchFamily="34" charset="0"/>
+              </a:rPr>
+              <a:t>M</a:t>
+            </a:r>
+            <a:endParaRPr lang="en-US" sz="800" dirty="0" smtClean="0">
+              <a:solidFill>
+                <a:schemeClr val="tx1"/>
+              </a:solidFill>
+              <a:latin typeface="Arial" pitchFamily="34" charset="0"/>
+              <a:cs typeface="Arial" pitchFamily="34" charset="0"/>
+            </a:endParaRPr>
           </a:p>
         </p:txBody>
       </p:sp>
@@ -6561,14 +6695,24 @@
           <a:p>
             <a:pPr algn="ctr"/>
             <a:r>
-              <a:rPr lang="en-US" sz="800" dirty="0" err="1" smtClean="0">
+              <a:rPr lang="en-US" sz="800" smtClean="0">
                 <a:solidFill>
                   <a:schemeClr val="tx1"/>
                 </a:solidFill>
                 <a:latin typeface="Arial" pitchFamily="34" charset="0"/>
                 <a:cs typeface="Arial" pitchFamily="34" charset="0"/>
               </a:rPr>
-              <a:t>s_M</a:t>
+              <a:t>s</a:t>
+            </a:r>
+            <a:r>
+              <a:rPr lang="en-US" sz="800" baseline="-25000">
+                <a:solidFill>
+                  <a:schemeClr val="tx1"/>
+                </a:solidFill>
+                <a:latin typeface="Arial" pitchFamily="34" charset="0"/>
+                <a:cs typeface="Arial" pitchFamily="34" charset="0"/>
+              </a:rPr>
+              <a:t>M</a:t>
             </a:r>
             <a:endParaRPr lang="en-US" sz="800" dirty="0" smtClean="0">
               <a:solidFill>
@@ -6892,7 +7036,17 @@
                 <a:latin typeface="Arial" pitchFamily="34" charset="0"/>
                 <a:cs typeface="Arial" pitchFamily="34" charset="0"/>
               </a:rPr>
-              <a:t>li_M</a:t>
+              <a:t>li</a:t>
+            </a:r>
+            <a:r>
+              <a:rPr lang="en-US" sz="800" baseline="-25000" dirty="0" err="1">
+                <a:solidFill>
+                  <a:schemeClr val="tx1"/>
+                </a:solidFill>
+                <a:latin typeface="Arial" pitchFamily="34" charset="0"/>
+                <a:cs typeface="Arial" pitchFamily="34" charset="0"/>
+              </a:rPr>
+              <a:t>M</a:t>
             </a:r>
             <a:endParaRPr lang="en-US" sz="800" dirty="0" smtClean="0">
               <a:solidFill>
@@ -7080,8 +7234,8 @@
         </p:nvSpPr>
         <p:spPr>
           <a:xfrm>
-            <a:off x="1450265" y="2627145"/>
-            <a:ext cx="512593" cy="146851"/>
+            <a:off x="1616074" y="2627145"/>
+            <a:ext cx="346784" cy="146851"/>
           </a:xfrm>
           <a:prstGeom prst="rect">
             <a:avLst/>
@@ -7120,8 +7274,191 @@
                 <a:latin typeface="Arial" pitchFamily="34" charset="0"/>
                 <a:cs typeface="Arial" pitchFamily="34" charset="0"/>
               </a:rPr>
-              <a:t>l_max</a:t>
-            </a:r>
+              <a:t>l</a:t>
+            </a:r>
+            <a:r>
+              <a:rPr lang="en-US" sz="800" baseline="-25000" dirty="0" err="1" smtClean="0">
+                <a:solidFill>
+                  <a:schemeClr val="tx1"/>
+                </a:solidFill>
+                <a:latin typeface="Arial" pitchFamily="34" charset="0"/>
+                <a:cs typeface="Arial" pitchFamily="34" charset="0"/>
+              </a:rPr>
+              <a:t>max</a:t>
+            </a:r>
+            <a:endParaRPr lang="en-US" sz="800" baseline="-25000" dirty="0" smtClean="0">
+              <a:solidFill>
+                <a:schemeClr val="tx1"/>
+              </a:solidFill>
+              <a:latin typeface="Arial" pitchFamily="34" charset="0"/>
+              <a:cs typeface="Arial" pitchFamily="34" charset="0"/>
+            </a:endParaRPr>
+          </a:p>
+        </p:txBody>
+      </p:sp>
+      <p:cxnSp>
+        <p:nvCxnSpPr>
+          <p:cNvPr id="61" name="Straight Arrow Connector 60"/>
+          <p:cNvCxnSpPr/>
+          <p:nvPr/>
+        </p:nvCxnSpPr>
+        <p:spPr>
+          <a:xfrm>
+            <a:off x="1899214" y="2700572"/>
+            <a:ext cx="144859" cy="0"/>
+          </a:xfrm>
+          <a:prstGeom prst="straightConnector1">
+            <a:avLst/>
+          </a:prstGeom>
+          <a:ln w="12700">
+            <a:solidFill>
+              <a:schemeClr val="tx1"/>
+            </a:solidFill>
+            <a:headEnd type="none" w="med" len="med"/>
+            <a:tailEnd type="triangle" w="med" len="med"/>
+          </a:ln>
+        </p:spPr>
+        <p:style>
+          <a:lnRef idx="1">
+            <a:schemeClr val="accent1"/>
+          </a:lnRef>
+          <a:fillRef idx="0">
+            <a:schemeClr val="accent1"/>
+          </a:fillRef>
+          <a:effectRef idx="0">
+            <a:schemeClr val="accent1"/>
+          </a:effectRef>
+          <a:fontRef idx="minor">
+            <a:schemeClr val="tx1"/>
+          </a:fontRef>
+        </p:style>
+      </p:cxnSp>
+    </p:spTree>
+    <p:extLst>
+      <p:ext uri="{BB962C8B-B14F-4D97-AF65-F5344CB8AC3E}">
+        <p14:creationId xmlns:p14="http://schemas.microsoft.com/office/powerpoint/2010/main" val="3985344424"/>
+      </p:ext>
+    </p:extLst>
+  </p:cSld>
+  <p:clrMapOvr>
+    <a:masterClrMapping/>
+  </p:clrMapOvr>
+</p:sld>
+</file>
+
+<file path=ppt/slides/slide5.xml><?xml version="1.0" encoding="utf-8"?>
+<p:sld xmlns:a="http://schemas.openxmlformats.org/drawingml/2006/main" xmlns:r="http://schemas.openxmlformats.org/officeDocument/2006/relationships" xmlns:p="http://schemas.openxmlformats.org/presentationml/2006/main">
+  <p:cSld>
+    <p:spTree>
+      <p:nvGrpSpPr>
+        <p:cNvPr id="1" name=""/>
+        <p:cNvGrpSpPr/>
+        <p:nvPr/>
+      </p:nvGrpSpPr>
+      <p:grpSpPr>
+        <a:xfrm>
+          <a:off x="0" y="0"/>
+          <a:ext cx="0" cy="0"/>
+          <a:chOff x="0" y="0"/>
+          <a:chExt cx="0" cy="0"/>
+        </a:xfrm>
+      </p:grpSpPr>
+      <p:sp>
+        <p:nvSpPr>
+          <p:cNvPr id="6" name="Rounded Rectangle 5"/>
+          <p:cNvSpPr/>
+          <p:nvPr/>
+        </p:nvSpPr>
+        <p:spPr>
+          <a:xfrm>
+            <a:off x="276099" y="121006"/>
+            <a:ext cx="2040063" cy="564794"/>
+          </a:xfrm>
+          <a:prstGeom prst="roundRect">
+            <a:avLst>
+              <a:gd name="adj" fmla="val 4386"/>
+            </a:avLst>
+          </a:prstGeom>
+          <a:solidFill>
+            <a:srgbClr val="FFFFCC"/>
+          </a:solidFill>
+          <a:ln w="12700">
+            <a:solidFill>
+              <a:schemeClr val="tx1"/>
+            </a:solidFill>
+          </a:ln>
+        </p:spPr>
+        <p:style>
+          <a:lnRef idx="2">
+            <a:schemeClr val="accent1">
+              <a:shade val="50000"/>
+            </a:schemeClr>
+          </a:lnRef>
+          <a:fillRef idx="1">
+            <a:schemeClr val="accent1"/>
+          </a:fillRef>
+          <a:effectRef idx="0">
+            <a:schemeClr val="accent1"/>
+          </a:effectRef>
+          <a:fontRef idx="minor">
+            <a:schemeClr val="lt1"/>
+          </a:fontRef>
+        </p:style>
+        <p:txBody>
+          <a:bodyPr rtlCol="0" anchor="ctr"/>
+          <a:lstStyle/>
+          <a:p>
+            <a:pPr algn="ctr"/>
+            <a:endParaRPr lang="en-US" sz="800" dirty="0">
+              <a:solidFill>
+                <a:schemeClr val="tx1"/>
+              </a:solidFill>
+              <a:latin typeface="Arial" pitchFamily="34" charset="0"/>
+              <a:cs typeface="Arial" pitchFamily="34" charset="0"/>
+            </a:endParaRPr>
+          </a:p>
+        </p:txBody>
+      </p:sp>
+      <p:sp>
+        <p:nvSpPr>
+          <p:cNvPr id="4" name="Rectangle 3"/>
+          <p:cNvSpPr/>
+          <p:nvPr/>
+        </p:nvSpPr>
+        <p:spPr>
+          <a:xfrm>
+            <a:off x="30162" y="76200"/>
+            <a:ext cx="2549274" cy="1600200"/>
+          </a:xfrm>
+          <a:prstGeom prst="rect">
+            <a:avLst/>
+          </a:prstGeom>
+          <a:noFill/>
+          <a:ln w="12700">
+            <a:noFill/>
+          </a:ln>
+        </p:spPr>
+        <p:style>
+          <a:lnRef idx="2">
+            <a:schemeClr val="accent1">
+              <a:shade val="50000"/>
+            </a:schemeClr>
+          </a:lnRef>
+          <a:fillRef idx="1">
+            <a:schemeClr val="accent1"/>
+          </a:fillRef>
+          <a:effectRef idx="0">
+            <a:schemeClr val="accent1"/>
+          </a:effectRef>
+          <a:fontRef idx="minor">
+            <a:schemeClr val="lt1"/>
+          </a:fontRef>
+        </p:style>
+        <p:txBody>
+          <a:bodyPr rtlCol="0" anchor="ctr"/>
+          <a:lstStyle/>
+          <a:p>
+            <a:pPr algn="ctr"/>
             <a:endParaRPr lang="en-US" sz="800" dirty="0" smtClean="0">
               <a:solidFill>
                 <a:schemeClr val="tx1"/>
@@ -7132,26 +7469,1750 @@
           </a:p>
         </p:txBody>
       </p:sp>
-      <p:cxnSp>
-        <p:nvCxnSpPr>
-          <p:cNvPr id="61" name="Straight Arrow Connector 60"/>
-          <p:cNvCxnSpPr/>
-          <p:nvPr/>
-        </p:nvCxnSpPr>
-        <p:spPr>
-          <a:xfrm>
-            <a:off x="1899214" y="2700572"/>
-            <a:ext cx="144859" cy="0"/>
-          </a:xfrm>
-          <a:prstGeom prst="straightConnector1">
-            <a:avLst/>
-          </a:prstGeom>
+      <p:sp>
+        <p:nvSpPr>
+          <p:cNvPr id="8" name="Rectangle 7"/>
+          <p:cNvSpPr/>
+          <p:nvPr/>
+        </p:nvSpPr>
+        <p:spPr>
+          <a:xfrm>
+            <a:off x="1516062" y="327203"/>
+            <a:ext cx="800100" cy="152400"/>
+          </a:xfrm>
+          <a:prstGeom prst="rect">
+            <a:avLst/>
+          </a:prstGeom>
+          <a:noFill/>
+          <a:ln w="12700">
+            <a:noFill/>
+          </a:ln>
+        </p:spPr>
+        <p:style>
+          <a:lnRef idx="2">
+            <a:schemeClr val="accent1">
+              <a:shade val="50000"/>
+            </a:schemeClr>
+          </a:lnRef>
+          <a:fillRef idx="1">
+            <a:schemeClr val="accent1"/>
+          </a:fillRef>
+          <a:effectRef idx="0">
+            <a:schemeClr val="accent1"/>
+          </a:effectRef>
+          <a:fontRef idx="minor">
+            <a:schemeClr val="lt1"/>
+          </a:fontRef>
+        </p:style>
+        <p:txBody>
+          <a:bodyPr rtlCol="0" anchor="ctr"/>
+          <a:lstStyle/>
+          <a:p>
+            <a:pPr algn="ctr"/>
+            <a:r>
+              <a:rPr lang="en-US" sz="800" dirty="0" smtClean="0">
+                <a:solidFill>
+                  <a:schemeClr val="tx1"/>
+                </a:solidFill>
+                <a:latin typeface="Arial" pitchFamily="34" charset="0"/>
+                <a:cs typeface="Arial" pitchFamily="34" charset="0"/>
+              </a:rPr>
+              <a:t>Basic Block 0</a:t>
+            </a:r>
+          </a:p>
+        </p:txBody>
+      </p:sp>
+      <p:sp>
+        <p:nvSpPr>
+          <p:cNvPr id="10" name="Rounded Rectangle 9"/>
+          <p:cNvSpPr/>
+          <p:nvPr/>
+        </p:nvSpPr>
+        <p:spPr>
+          <a:xfrm>
+            <a:off x="276099" y="762000"/>
+            <a:ext cx="2040063" cy="647700"/>
+          </a:xfrm>
+          <a:prstGeom prst="roundRect">
+            <a:avLst>
+              <a:gd name="adj" fmla="val 4386"/>
+            </a:avLst>
+          </a:prstGeom>
+          <a:solidFill>
+            <a:srgbClr val="FFFFCC"/>
+          </a:solidFill>
           <a:ln w="12700">
             <a:solidFill>
               <a:schemeClr val="tx1"/>
             </a:solidFill>
-            <a:headEnd type="none" w="med" len="med"/>
-            <a:tailEnd type="triangle" w="med" len="med"/>
+          </a:ln>
+        </p:spPr>
+        <p:style>
+          <a:lnRef idx="2">
+            <a:schemeClr val="accent1">
+              <a:shade val="50000"/>
+            </a:schemeClr>
+          </a:lnRef>
+          <a:fillRef idx="1">
+            <a:schemeClr val="accent1"/>
+          </a:fillRef>
+          <a:effectRef idx="0">
+            <a:schemeClr val="accent1"/>
+          </a:effectRef>
+          <a:fontRef idx="minor">
+            <a:schemeClr val="lt1"/>
+          </a:fontRef>
+        </p:style>
+        <p:txBody>
+          <a:bodyPr rtlCol="0" anchor="ctr"/>
+          <a:lstStyle/>
+          <a:p>
+            <a:pPr algn="ctr"/>
+            <a:endParaRPr lang="en-US" sz="800" dirty="0">
+              <a:solidFill>
+                <a:schemeClr val="tx1"/>
+              </a:solidFill>
+              <a:latin typeface="Arial" pitchFamily="34" charset="0"/>
+              <a:cs typeface="Arial" pitchFamily="34" charset="0"/>
+            </a:endParaRPr>
+          </a:p>
+        </p:txBody>
+      </p:sp>
+      <p:sp>
+        <p:nvSpPr>
+          <p:cNvPr id="11" name="Rectangle 10"/>
+          <p:cNvSpPr/>
+          <p:nvPr/>
+        </p:nvSpPr>
+        <p:spPr>
+          <a:xfrm>
+            <a:off x="1516062" y="1009650"/>
+            <a:ext cx="800100" cy="152400"/>
+          </a:xfrm>
+          <a:prstGeom prst="rect">
+            <a:avLst/>
+          </a:prstGeom>
+          <a:noFill/>
+          <a:ln w="12700">
+            <a:noFill/>
+          </a:ln>
+        </p:spPr>
+        <p:style>
+          <a:lnRef idx="2">
+            <a:schemeClr val="accent1">
+              <a:shade val="50000"/>
+            </a:schemeClr>
+          </a:lnRef>
+          <a:fillRef idx="1">
+            <a:schemeClr val="accent1"/>
+          </a:fillRef>
+          <a:effectRef idx="0">
+            <a:schemeClr val="accent1"/>
+          </a:effectRef>
+          <a:fontRef idx="minor">
+            <a:schemeClr val="lt1"/>
+          </a:fontRef>
+        </p:style>
+        <p:txBody>
+          <a:bodyPr rtlCol="0" anchor="ctr"/>
+          <a:lstStyle/>
+          <a:p>
+            <a:pPr algn="ctr"/>
+            <a:r>
+              <a:rPr lang="en-US" sz="800" dirty="0" smtClean="0">
+                <a:solidFill>
+                  <a:schemeClr val="tx1"/>
+                </a:solidFill>
+                <a:latin typeface="Arial" pitchFamily="34" charset="0"/>
+                <a:cs typeface="Arial" pitchFamily="34" charset="0"/>
+              </a:rPr>
+              <a:t>Basic Block 1</a:t>
+            </a:r>
+          </a:p>
+        </p:txBody>
+      </p:sp>
+      <p:sp>
+        <p:nvSpPr>
+          <p:cNvPr id="12" name="Rounded Rectangle 11"/>
+          <p:cNvSpPr/>
+          <p:nvPr/>
+        </p:nvSpPr>
+        <p:spPr>
+          <a:xfrm>
+            <a:off x="276099" y="1485900"/>
+            <a:ext cx="2040063" cy="533400"/>
+          </a:xfrm>
+          <a:prstGeom prst="roundRect">
+            <a:avLst>
+              <a:gd name="adj" fmla="val 4386"/>
+            </a:avLst>
+          </a:prstGeom>
+          <a:solidFill>
+            <a:srgbClr val="FFFFCC"/>
+          </a:solidFill>
+          <a:ln w="12700">
+            <a:solidFill>
+              <a:schemeClr val="tx1"/>
+            </a:solidFill>
+          </a:ln>
+        </p:spPr>
+        <p:style>
+          <a:lnRef idx="2">
+            <a:schemeClr val="accent1">
+              <a:shade val="50000"/>
+            </a:schemeClr>
+          </a:lnRef>
+          <a:fillRef idx="1">
+            <a:schemeClr val="accent1"/>
+          </a:fillRef>
+          <a:effectRef idx="0">
+            <a:schemeClr val="accent1"/>
+          </a:effectRef>
+          <a:fontRef idx="minor">
+            <a:schemeClr val="lt1"/>
+          </a:fontRef>
+        </p:style>
+        <p:txBody>
+          <a:bodyPr rtlCol="0" anchor="ctr"/>
+          <a:lstStyle/>
+          <a:p>
+            <a:pPr algn="ctr"/>
+            <a:endParaRPr lang="en-US" sz="800" dirty="0">
+              <a:solidFill>
+                <a:schemeClr val="tx1"/>
+              </a:solidFill>
+              <a:latin typeface="Arial" pitchFamily="34" charset="0"/>
+              <a:cs typeface="Arial" pitchFamily="34" charset="0"/>
+            </a:endParaRPr>
+          </a:p>
+        </p:txBody>
+      </p:sp>
+      <p:sp>
+        <p:nvSpPr>
+          <p:cNvPr id="13" name="Rectangle 12"/>
+          <p:cNvSpPr/>
+          <p:nvPr/>
+        </p:nvSpPr>
+        <p:spPr>
+          <a:xfrm>
+            <a:off x="1516062" y="1676400"/>
+            <a:ext cx="800100" cy="152400"/>
+          </a:xfrm>
+          <a:prstGeom prst="rect">
+            <a:avLst/>
+          </a:prstGeom>
+          <a:noFill/>
+          <a:ln w="12700">
+            <a:noFill/>
+          </a:ln>
+        </p:spPr>
+        <p:style>
+          <a:lnRef idx="2">
+            <a:schemeClr val="accent1">
+              <a:shade val="50000"/>
+            </a:schemeClr>
+          </a:lnRef>
+          <a:fillRef idx="1">
+            <a:schemeClr val="accent1"/>
+          </a:fillRef>
+          <a:effectRef idx="0">
+            <a:schemeClr val="accent1"/>
+          </a:effectRef>
+          <a:fontRef idx="minor">
+            <a:schemeClr val="lt1"/>
+          </a:fontRef>
+        </p:style>
+        <p:txBody>
+          <a:bodyPr rtlCol="0" anchor="ctr"/>
+          <a:lstStyle/>
+          <a:p>
+            <a:pPr algn="ctr"/>
+            <a:r>
+              <a:rPr lang="en-US" sz="800" dirty="0" smtClean="0">
+                <a:solidFill>
+                  <a:schemeClr val="tx1"/>
+                </a:solidFill>
+                <a:latin typeface="Arial" pitchFamily="34" charset="0"/>
+                <a:cs typeface="Arial" pitchFamily="34" charset="0"/>
+              </a:rPr>
+              <a:t>Basic Block 2</a:t>
+            </a:r>
+          </a:p>
+        </p:txBody>
+      </p:sp>
+      <p:sp>
+        <p:nvSpPr>
+          <p:cNvPr id="14" name="Rounded Rectangle 13"/>
+          <p:cNvSpPr/>
+          <p:nvPr/>
+        </p:nvSpPr>
+        <p:spPr>
+          <a:xfrm>
+            <a:off x="276099" y="2081480"/>
+            <a:ext cx="2040063" cy="585520"/>
+          </a:xfrm>
+          <a:prstGeom prst="roundRect">
+            <a:avLst>
+              <a:gd name="adj" fmla="val 4386"/>
+            </a:avLst>
+          </a:prstGeom>
+          <a:solidFill>
+            <a:srgbClr val="FFFFCC"/>
+          </a:solidFill>
+          <a:ln w="12700">
+            <a:solidFill>
+              <a:schemeClr val="tx1"/>
+            </a:solidFill>
+          </a:ln>
+        </p:spPr>
+        <p:style>
+          <a:lnRef idx="2">
+            <a:schemeClr val="accent1">
+              <a:shade val="50000"/>
+            </a:schemeClr>
+          </a:lnRef>
+          <a:fillRef idx="1">
+            <a:schemeClr val="accent1"/>
+          </a:fillRef>
+          <a:effectRef idx="0">
+            <a:schemeClr val="accent1"/>
+          </a:effectRef>
+          <a:fontRef idx="minor">
+            <a:schemeClr val="lt1"/>
+          </a:fontRef>
+        </p:style>
+        <p:txBody>
+          <a:bodyPr rtlCol="0" anchor="ctr"/>
+          <a:lstStyle/>
+          <a:p>
+            <a:pPr algn="ctr"/>
+            <a:endParaRPr lang="en-US" sz="800" dirty="0">
+              <a:solidFill>
+                <a:schemeClr val="tx1"/>
+              </a:solidFill>
+              <a:latin typeface="Arial" pitchFamily="34" charset="0"/>
+              <a:cs typeface="Arial" pitchFamily="34" charset="0"/>
+            </a:endParaRPr>
+          </a:p>
+        </p:txBody>
+      </p:sp>
+      <p:sp>
+        <p:nvSpPr>
+          <p:cNvPr id="15" name="Rectangle 14"/>
+          <p:cNvSpPr/>
+          <p:nvPr/>
+        </p:nvSpPr>
+        <p:spPr>
+          <a:xfrm>
+            <a:off x="1516062" y="2298040"/>
+            <a:ext cx="800100" cy="152400"/>
+          </a:xfrm>
+          <a:prstGeom prst="rect">
+            <a:avLst/>
+          </a:prstGeom>
+          <a:noFill/>
+          <a:ln w="12700">
+            <a:noFill/>
+          </a:ln>
+        </p:spPr>
+        <p:style>
+          <a:lnRef idx="2">
+            <a:schemeClr val="accent1">
+              <a:shade val="50000"/>
+            </a:schemeClr>
+          </a:lnRef>
+          <a:fillRef idx="1">
+            <a:schemeClr val="accent1"/>
+          </a:fillRef>
+          <a:effectRef idx="0">
+            <a:schemeClr val="accent1"/>
+          </a:effectRef>
+          <a:fontRef idx="minor">
+            <a:schemeClr val="lt1"/>
+          </a:fontRef>
+        </p:style>
+        <p:txBody>
+          <a:bodyPr rtlCol="0" anchor="ctr"/>
+          <a:lstStyle/>
+          <a:p>
+            <a:pPr algn="ctr"/>
+            <a:r>
+              <a:rPr lang="en-US" sz="800" dirty="0" smtClean="0">
+                <a:solidFill>
+                  <a:schemeClr val="tx1"/>
+                </a:solidFill>
+                <a:latin typeface="Arial" pitchFamily="34" charset="0"/>
+                <a:cs typeface="Arial" pitchFamily="34" charset="0"/>
+              </a:rPr>
+              <a:t>Basic Block 3</a:t>
+            </a:r>
+          </a:p>
+        </p:txBody>
+      </p:sp>
+      <p:sp>
+        <p:nvSpPr>
+          <p:cNvPr id="3" name="Rounded Rectangle 2"/>
+          <p:cNvSpPr/>
+          <p:nvPr/>
+        </p:nvSpPr>
+        <p:spPr>
+          <a:xfrm>
+            <a:off x="182562" y="76200"/>
+            <a:ext cx="2209800" cy="2667000"/>
+          </a:xfrm>
+          <a:prstGeom prst="roundRect">
+            <a:avLst>
+              <a:gd name="adj" fmla="val 4386"/>
+            </a:avLst>
+          </a:prstGeom>
+          <a:noFill/>
+          <a:ln w="12700">
+            <a:solidFill>
+              <a:schemeClr val="tx1"/>
+            </a:solidFill>
+          </a:ln>
+        </p:spPr>
+        <p:style>
+          <a:lnRef idx="2">
+            <a:schemeClr val="accent1">
+              <a:shade val="50000"/>
+            </a:schemeClr>
+          </a:lnRef>
+          <a:fillRef idx="1">
+            <a:schemeClr val="accent1"/>
+          </a:fillRef>
+          <a:effectRef idx="0">
+            <a:schemeClr val="accent1"/>
+          </a:effectRef>
+          <a:fontRef idx="minor">
+            <a:schemeClr val="lt1"/>
+          </a:fontRef>
+        </p:style>
+        <p:txBody>
+          <a:bodyPr rtlCol="0" anchor="t" anchorCtr="0"/>
+          <a:lstStyle/>
+          <a:p>
+            <a:r>
+              <a:rPr lang="en-US" sz="800" dirty="0" smtClean="0">
+                <a:solidFill>
+                  <a:schemeClr val="tx1"/>
+                </a:solidFill>
+                <a:latin typeface="Consolas" pitchFamily="49" charset="0"/>
+                <a:cs typeface="Consolas" pitchFamily="49" charset="0"/>
+              </a:rPr>
+              <a:t>L0: </a:t>
+            </a:r>
+            <a:r>
+              <a:rPr lang="en-US" sz="800" dirty="0" err="1" smtClean="0">
+                <a:solidFill>
+                  <a:schemeClr val="tx1"/>
+                </a:solidFill>
+                <a:latin typeface="Consolas" pitchFamily="49" charset="0"/>
+                <a:cs typeface="Consolas" pitchFamily="49" charset="0"/>
+              </a:rPr>
+              <a:t>mov</a:t>
+            </a:r>
+            <a:r>
+              <a:rPr lang="en-US" sz="800" dirty="0" smtClean="0">
+                <a:solidFill>
+                  <a:schemeClr val="tx1"/>
+                </a:solidFill>
+                <a:latin typeface="Consolas" pitchFamily="49" charset="0"/>
+                <a:cs typeface="Consolas" pitchFamily="49" charset="0"/>
+              </a:rPr>
+              <a:t> r1, </a:t>
+            </a:r>
+            <a:r>
+              <a:rPr lang="en-US" sz="800" dirty="0" err="1" smtClean="0">
+                <a:solidFill>
+                  <a:schemeClr val="tx1"/>
+                </a:solidFill>
+                <a:latin typeface="Consolas" pitchFamily="49" charset="0"/>
+                <a:cs typeface="Consolas" pitchFamily="49" charset="0"/>
+              </a:rPr>
+              <a:t>addr</a:t>
+            </a:r>
+            <a:endParaRPr lang="en-US" sz="800" dirty="0" smtClean="0">
+              <a:solidFill>
+                <a:schemeClr val="tx1"/>
+              </a:solidFill>
+              <a:latin typeface="Consolas" pitchFamily="49" charset="0"/>
+              <a:cs typeface="Consolas" pitchFamily="49" charset="0"/>
+            </a:endParaRPr>
+          </a:p>
+          <a:p>
+            <a:r>
+              <a:rPr lang="en-US" sz="800" dirty="0" smtClean="0">
+                <a:solidFill>
+                  <a:schemeClr val="tx1"/>
+                </a:solidFill>
+                <a:latin typeface="Consolas" pitchFamily="49" charset="0"/>
+                <a:cs typeface="Consolas" pitchFamily="49" charset="0"/>
+              </a:rPr>
+              <a:t>    </a:t>
+            </a:r>
+            <a:r>
+              <a:rPr lang="en-US" sz="800" dirty="0" err="1" smtClean="0">
+                <a:solidFill>
+                  <a:schemeClr val="tx1"/>
+                </a:solidFill>
+                <a:latin typeface="Consolas" pitchFamily="49" charset="0"/>
+                <a:cs typeface="Consolas" pitchFamily="49" charset="0"/>
+              </a:rPr>
+              <a:t>ldr</a:t>
+            </a:r>
+            <a:r>
+              <a:rPr lang="en-US" sz="800" dirty="0" smtClean="0">
+                <a:solidFill>
+                  <a:schemeClr val="tx1"/>
+                </a:solidFill>
+                <a:latin typeface="Consolas" pitchFamily="49" charset="0"/>
+                <a:cs typeface="Consolas" pitchFamily="49" charset="0"/>
+              </a:rPr>
+              <a:t> r2, [r1, #0]</a:t>
+            </a:r>
+          </a:p>
+          <a:p>
+            <a:r>
+              <a:rPr lang="en-US" sz="800" dirty="0" smtClean="0">
+                <a:solidFill>
+                  <a:schemeClr val="tx1"/>
+                </a:solidFill>
+                <a:latin typeface="Consolas" pitchFamily="49" charset="0"/>
+                <a:cs typeface="Consolas" pitchFamily="49" charset="0"/>
+              </a:rPr>
+              <a:t>    </a:t>
+            </a:r>
+            <a:r>
+              <a:rPr lang="en-US" sz="800" dirty="0" err="1" smtClean="0">
+                <a:solidFill>
+                  <a:schemeClr val="tx1"/>
+                </a:solidFill>
+                <a:latin typeface="Consolas" pitchFamily="49" charset="0"/>
+                <a:cs typeface="Consolas" pitchFamily="49" charset="0"/>
+              </a:rPr>
+              <a:t>cmp</a:t>
+            </a:r>
+            <a:r>
+              <a:rPr lang="en-US" sz="800" dirty="0" smtClean="0">
+                <a:solidFill>
+                  <a:schemeClr val="tx1"/>
+                </a:solidFill>
+                <a:latin typeface="Consolas" pitchFamily="49" charset="0"/>
+                <a:cs typeface="Consolas" pitchFamily="49" charset="0"/>
+              </a:rPr>
+              <a:t> r2, r3</a:t>
+            </a:r>
+          </a:p>
+          <a:p>
+            <a:r>
+              <a:rPr lang="en-US" sz="800" dirty="0" smtClean="0">
+                <a:solidFill>
+                  <a:schemeClr val="tx1"/>
+                </a:solidFill>
+                <a:latin typeface="Consolas" pitchFamily="49" charset="0"/>
+                <a:cs typeface="Consolas" pitchFamily="49" charset="0"/>
+              </a:rPr>
+              <a:t>    </a:t>
+            </a:r>
+            <a:r>
+              <a:rPr lang="en-US" sz="800" dirty="0" err="1" smtClean="0">
+                <a:solidFill>
+                  <a:schemeClr val="tx1"/>
+                </a:solidFill>
+                <a:latin typeface="Consolas" pitchFamily="49" charset="0"/>
+                <a:cs typeface="Consolas" pitchFamily="49" charset="0"/>
+              </a:rPr>
+              <a:t>beq</a:t>
+            </a:r>
+            <a:r>
+              <a:rPr lang="en-US" sz="800" dirty="0" smtClean="0">
+                <a:solidFill>
+                  <a:schemeClr val="tx1"/>
+                </a:solidFill>
+                <a:latin typeface="Consolas" pitchFamily="49" charset="0"/>
+                <a:cs typeface="Consolas" pitchFamily="49" charset="0"/>
+              </a:rPr>
+              <a:t> L2</a:t>
+            </a:r>
+          </a:p>
+          <a:p>
+            <a:endParaRPr lang="en-US" sz="800" dirty="0" smtClean="0">
+              <a:solidFill>
+                <a:schemeClr val="tx1"/>
+              </a:solidFill>
+              <a:latin typeface="Consolas" pitchFamily="49" charset="0"/>
+              <a:cs typeface="Consolas" pitchFamily="49" charset="0"/>
+            </a:endParaRPr>
+          </a:p>
+          <a:p>
+            <a:r>
+              <a:rPr lang="en-US" sz="800" dirty="0" smtClean="0">
+                <a:solidFill>
+                  <a:schemeClr val="tx1"/>
+                </a:solidFill>
+                <a:latin typeface="Consolas" pitchFamily="49" charset="0"/>
+                <a:cs typeface="Consolas" pitchFamily="49" charset="0"/>
+              </a:rPr>
+              <a:t>L1: add r2, r2, r2</a:t>
+            </a:r>
+          </a:p>
+          <a:p>
+            <a:r>
+              <a:rPr lang="en-US" sz="800" dirty="0">
+                <a:solidFill>
+                  <a:schemeClr val="tx1"/>
+                </a:solidFill>
+                <a:latin typeface="Consolas" pitchFamily="49" charset="0"/>
+                <a:cs typeface="Consolas" pitchFamily="49" charset="0"/>
+              </a:rPr>
+              <a:t> </a:t>
+            </a:r>
+            <a:r>
+              <a:rPr lang="en-US" sz="800" dirty="0" smtClean="0">
+                <a:solidFill>
+                  <a:schemeClr val="tx1"/>
+                </a:solidFill>
+                <a:latin typeface="Consolas" pitchFamily="49" charset="0"/>
+                <a:cs typeface="Consolas" pitchFamily="49" charset="0"/>
+              </a:rPr>
+              <a:t>   sub r2, r2, r3</a:t>
+            </a:r>
+          </a:p>
+          <a:p>
+            <a:r>
+              <a:rPr lang="en-US" sz="800" dirty="0">
+                <a:solidFill>
+                  <a:schemeClr val="tx1"/>
+                </a:solidFill>
+                <a:latin typeface="Consolas" pitchFamily="49" charset="0"/>
+                <a:cs typeface="Consolas" pitchFamily="49" charset="0"/>
+              </a:rPr>
+              <a:t> </a:t>
+            </a:r>
+            <a:r>
+              <a:rPr lang="en-US" sz="800" dirty="0" smtClean="0">
+                <a:solidFill>
+                  <a:schemeClr val="tx1"/>
+                </a:solidFill>
+                <a:latin typeface="Consolas" pitchFamily="49" charset="0"/>
+                <a:cs typeface="Consolas" pitchFamily="49" charset="0"/>
+              </a:rPr>
+              <a:t>   add r2, r2, #1</a:t>
+            </a:r>
+          </a:p>
+          <a:p>
+            <a:r>
+              <a:rPr lang="en-US" sz="800" dirty="0">
+                <a:solidFill>
+                  <a:schemeClr val="tx1"/>
+                </a:solidFill>
+                <a:latin typeface="Consolas" pitchFamily="49" charset="0"/>
+                <a:cs typeface="Consolas" pitchFamily="49" charset="0"/>
+              </a:rPr>
+              <a:t> </a:t>
+            </a:r>
+            <a:r>
+              <a:rPr lang="en-US" sz="800" dirty="0" smtClean="0">
+                <a:solidFill>
+                  <a:schemeClr val="tx1"/>
+                </a:solidFill>
+                <a:latin typeface="Consolas" pitchFamily="49" charset="0"/>
+                <a:cs typeface="Consolas" pitchFamily="49" charset="0"/>
+              </a:rPr>
+              <a:t>   add r3, r3, #1</a:t>
+            </a:r>
+          </a:p>
+          <a:p>
+            <a:r>
+              <a:rPr lang="en-US" sz="800" dirty="0" smtClean="0">
+                <a:solidFill>
+                  <a:schemeClr val="tx1"/>
+                </a:solidFill>
+                <a:latin typeface="Consolas" pitchFamily="49" charset="0"/>
+                <a:cs typeface="Consolas" pitchFamily="49" charset="0"/>
+              </a:rPr>
+              <a:t>    </a:t>
+            </a:r>
+            <a:r>
+              <a:rPr lang="en-US" sz="800" dirty="0" err="1" smtClean="0">
+                <a:solidFill>
+                  <a:schemeClr val="tx1"/>
+                </a:solidFill>
+                <a:latin typeface="Consolas" pitchFamily="49" charset="0"/>
+                <a:cs typeface="Consolas" pitchFamily="49" charset="0"/>
+              </a:rPr>
+              <a:t>jmp</a:t>
+            </a:r>
+            <a:r>
+              <a:rPr lang="en-US" sz="800" dirty="0" smtClean="0">
+                <a:solidFill>
+                  <a:schemeClr val="tx1"/>
+                </a:solidFill>
+                <a:latin typeface="Consolas" pitchFamily="49" charset="0"/>
+                <a:cs typeface="Consolas" pitchFamily="49" charset="0"/>
+              </a:rPr>
+              <a:t> L3</a:t>
+            </a:r>
+          </a:p>
+          <a:p>
+            <a:endParaRPr lang="en-US" sz="800" dirty="0" smtClean="0">
+              <a:solidFill>
+                <a:schemeClr val="tx1"/>
+              </a:solidFill>
+              <a:latin typeface="Consolas" pitchFamily="49" charset="0"/>
+              <a:cs typeface="Consolas" pitchFamily="49" charset="0"/>
+            </a:endParaRPr>
+          </a:p>
+          <a:p>
+            <a:r>
+              <a:rPr lang="en-US" sz="800" dirty="0" smtClean="0">
+                <a:solidFill>
+                  <a:schemeClr val="tx1"/>
+                </a:solidFill>
+                <a:latin typeface="Consolas" pitchFamily="49" charset="0"/>
+                <a:cs typeface="Consolas" pitchFamily="49" charset="0"/>
+              </a:rPr>
+              <a:t>L2: add r2, r2, r2</a:t>
+            </a:r>
+          </a:p>
+          <a:p>
+            <a:r>
+              <a:rPr lang="en-US" sz="800" dirty="0">
+                <a:solidFill>
+                  <a:schemeClr val="tx1"/>
+                </a:solidFill>
+                <a:latin typeface="Consolas" pitchFamily="49" charset="0"/>
+                <a:cs typeface="Consolas" pitchFamily="49" charset="0"/>
+              </a:rPr>
+              <a:t> </a:t>
+            </a:r>
+            <a:r>
+              <a:rPr lang="en-US" sz="800" dirty="0" smtClean="0">
+                <a:solidFill>
+                  <a:schemeClr val="tx1"/>
+                </a:solidFill>
+                <a:latin typeface="Consolas" pitchFamily="49" charset="0"/>
+                <a:cs typeface="Consolas" pitchFamily="49" charset="0"/>
+              </a:rPr>
+              <a:t>   add r2, r2, #1</a:t>
+            </a:r>
+          </a:p>
+          <a:p>
+            <a:r>
+              <a:rPr lang="en-US" sz="800" dirty="0">
+                <a:solidFill>
+                  <a:schemeClr val="tx1"/>
+                </a:solidFill>
+                <a:latin typeface="Consolas" pitchFamily="49" charset="0"/>
+                <a:cs typeface="Consolas" pitchFamily="49" charset="0"/>
+              </a:rPr>
+              <a:t> </a:t>
+            </a:r>
+            <a:r>
+              <a:rPr lang="en-US" sz="800" dirty="0" smtClean="0">
+                <a:solidFill>
+                  <a:schemeClr val="tx1"/>
+                </a:solidFill>
+                <a:latin typeface="Consolas" pitchFamily="49" charset="0"/>
+                <a:cs typeface="Consolas" pitchFamily="49" charset="0"/>
+              </a:rPr>
+              <a:t>   </a:t>
+            </a:r>
+            <a:r>
+              <a:rPr lang="en-US" sz="800" dirty="0" err="1" smtClean="0">
+                <a:solidFill>
+                  <a:schemeClr val="tx1"/>
+                </a:solidFill>
+                <a:latin typeface="Consolas" pitchFamily="49" charset="0"/>
+                <a:cs typeface="Consolas" pitchFamily="49" charset="0"/>
+              </a:rPr>
+              <a:t>ldr</a:t>
+            </a:r>
+            <a:r>
+              <a:rPr lang="en-US" sz="800" dirty="0" smtClean="0">
+                <a:solidFill>
+                  <a:schemeClr val="tx1"/>
+                </a:solidFill>
+                <a:latin typeface="Consolas" pitchFamily="49" charset="0"/>
+                <a:cs typeface="Consolas" pitchFamily="49" charset="0"/>
+              </a:rPr>
+              <a:t> r2, [r2, #0]</a:t>
+            </a:r>
+          </a:p>
+          <a:p>
+            <a:r>
+              <a:rPr lang="en-US" sz="800" dirty="0">
+                <a:solidFill>
+                  <a:schemeClr val="tx1"/>
+                </a:solidFill>
+                <a:latin typeface="Consolas" pitchFamily="49" charset="0"/>
+                <a:cs typeface="Consolas" pitchFamily="49" charset="0"/>
+              </a:rPr>
+              <a:t> </a:t>
+            </a:r>
+            <a:r>
+              <a:rPr lang="en-US" sz="800" dirty="0" smtClean="0">
+                <a:solidFill>
+                  <a:schemeClr val="tx1"/>
+                </a:solidFill>
+                <a:latin typeface="Consolas" pitchFamily="49" charset="0"/>
+                <a:cs typeface="Consolas" pitchFamily="49" charset="0"/>
+              </a:rPr>
+              <a:t>   </a:t>
+            </a:r>
+            <a:r>
+              <a:rPr lang="en-US" sz="800" dirty="0" err="1" smtClean="0">
+                <a:solidFill>
+                  <a:schemeClr val="tx1"/>
+                </a:solidFill>
+                <a:latin typeface="Consolas" pitchFamily="49" charset="0"/>
+                <a:cs typeface="Consolas" pitchFamily="49" charset="0"/>
+              </a:rPr>
+              <a:t>mov</a:t>
+            </a:r>
+            <a:r>
+              <a:rPr lang="en-US" sz="800" dirty="0" smtClean="0">
+                <a:solidFill>
+                  <a:schemeClr val="tx1"/>
+                </a:solidFill>
+                <a:latin typeface="Consolas" pitchFamily="49" charset="0"/>
+                <a:cs typeface="Consolas" pitchFamily="49" charset="0"/>
+              </a:rPr>
+              <a:t> r3, r2</a:t>
+            </a:r>
+          </a:p>
+          <a:p>
+            <a:endParaRPr lang="en-US" sz="800" dirty="0" smtClean="0">
+              <a:solidFill>
+                <a:schemeClr val="tx1"/>
+              </a:solidFill>
+              <a:latin typeface="Consolas" pitchFamily="49" charset="0"/>
+              <a:cs typeface="Consolas" pitchFamily="49" charset="0"/>
+            </a:endParaRPr>
+          </a:p>
+          <a:p>
+            <a:r>
+              <a:rPr lang="en-US" sz="800" dirty="0" smtClean="0">
+                <a:solidFill>
+                  <a:schemeClr val="tx1"/>
+                </a:solidFill>
+                <a:latin typeface="Consolas" pitchFamily="49" charset="0"/>
+                <a:cs typeface="Consolas" pitchFamily="49" charset="0"/>
+              </a:rPr>
+              <a:t>L3: add r1, </a:t>
+            </a:r>
+            <a:r>
+              <a:rPr lang="en-US" sz="800" dirty="0" err="1" smtClean="0">
+                <a:solidFill>
+                  <a:schemeClr val="tx1"/>
+                </a:solidFill>
+                <a:latin typeface="Consolas" pitchFamily="49" charset="0"/>
+                <a:cs typeface="Consolas" pitchFamily="49" charset="0"/>
+              </a:rPr>
+              <a:t>addr</a:t>
+            </a:r>
+            <a:endParaRPr lang="en-US" sz="800" dirty="0" smtClean="0">
+              <a:solidFill>
+                <a:schemeClr val="tx1"/>
+              </a:solidFill>
+              <a:latin typeface="Consolas" pitchFamily="49" charset="0"/>
+              <a:cs typeface="Consolas" pitchFamily="49" charset="0"/>
+            </a:endParaRPr>
+          </a:p>
+          <a:p>
+            <a:r>
+              <a:rPr lang="en-US" sz="800" dirty="0">
+                <a:solidFill>
+                  <a:schemeClr val="tx1"/>
+                </a:solidFill>
+                <a:latin typeface="Consolas" pitchFamily="49" charset="0"/>
+                <a:cs typeface="Consolas" pitchFamily="49" charset="0"/>
+              </a:rPr>
+              <a:t> </a:t>
+            </a:r>
+            <a:r>
+              <a:rPr lang="en-US" sz="800" dirty="0" smtClean="0">
+                <a:solidFill>
+                  <a:schemeClr val="tx1"/>
+                </a:solidFill>
+                <a:latin typeface="Consolas" pitchFamily="49" charset="0"/>
+                <a:cs typeface="Consolas" pitchFamily="49" charset="0"/>
+              </a:rPr>
+              <a:t>   add r1, r1, r2</a:t>
+            </a:r>
+          </a:p>
+          <a:p>
+            <a:r>
+              <a:rPr lang="en-US" sz="800" dirty="0">
+                <a:solidFill>
+                  <a:schemeClr val="tx1"/>
+                </a:solidFill>
+                <a:latin typeface="Consolas" pitchFamily="49" charset="0"/>
+                <a:cs typeface="Consolas" pitchFamily="49" charset="0"/>
+              </a:rPr>
+              <a:t> </a:t>
+            </a:r>
+            <a:r>
+              <a:rPr lang="en-US" sz="800" dirty="0" smtClean="0">
+                <a:solidFill>
+                  <a:schemeClr val="tx1"/>
+                </a:solidFill>
+                <a:latin typeface="Consolas" pitchFamily="49" charset="0"/>
+                <a:cs typeface="Consolas" pitchFamily="49" charset="0"/>
+              </a:rPr>
+              <a:t>   add r1, r1, r3</a:t>
+            </a:r>
+          </a:p>
+          <a:p>
+            <a:r>
+              <a:rPr lang="en-US" sz="800" dirty="0">
+                <a:solidFill>
+                  <a:schemeClr val="tx1"/>
+                </a:solidFill>
+                <a:latin typeface="Consolas" pitchFamily="49" charset="0"/>
+                <a:cs typeface="Consolas" pitchFamily="49" charset="0"/>
+              </a:rPr>
+              <a:t> </a:t>
+            </a:r>
+            <a:r>
+              <a:rPr lang="en-US" sz="800" dirty="0" smtClean="0">
+                <a:solidFill>
+                  <a:schemeClr val="tx1"/>
+                </a:solidFill>
+                <a:latin typeface="Consolas" pitchFamily="49" charset="0"/>
+                <a:cs typeface="Consolas" pitchFamily="49" charset="0"/>
+              </a:rPr>
+              <a:t>   </a:t>
+            </a:r>
+            <a:r>
+              <a:rPr lang="en-US" sz="800" dirty="0" err="1" smtClean="0">
+                <a:solidFill>
+                  <a:schemeClr val="tx1"/>
+                </a:solidFill>
+                <a:latin typeface="Consolas" pitchFamily="49" charset="0"/>
+                <a:cs typeface="Consolas" pitchFamily="49" charset="0"/>
+              </a:rPr>
+              <a:t>ldr</a:t>
+            </a:r>
+            <a:r>
+              <a:rPr lang="en-US" sz="800" dirty="0" smtClean="0">
+                <a:solidFill>
+                  <a:schemeClr val="tx1"/>
+                </a:solidFill>
+                <a:latin typeface="Consolas" pitchFamily="49" charset="0"/>
+                <a:cs typeface="Consolas" pitchFamily="49" charset="0"/>
+              </a:rPr>
+              <a:t> r3, [r1, #0]</a:t>
+            </a:r>
+          </a:p>
+        </p:txBody>
+      </p:sp>
+    </p:spTree>
+    <p:extLst>
+      <p:ext uri="{BB962C8B-B14F-4D97-AF65-F5344CB8AC3E}">
+        <p14:creationId xmlns:p14="http://schemas.microsoft.com/office/powerpoint/2010/main" val="1292086885"/>
+      </p:ext>
+    </p:extLst>
+  </p:cSld>
+  <p:clrMapOvr>
+    <a:masterClrMapping/>
+  </p:clrMapOvr>
+</p:sld>
+</file>
+
+<file path=ppt/slides/slide6.xml><?xml version="1.0" encoding="utf-8"?>
+<p:sld xmlns:a="http://schemas.openxmlformats.org/drawingml/2006/main" xmlns:r="http://schemas.openxmlformats.org/officeDocument/2006/relationships" xmlns:p="http://schemas.openxmlformats.org/presentationml/2006/main">
+  <p:cSld>
+    <p:spTree>
+      <p:nvGrpSpPr>
+        <p:cNvPr id="1" name=""/>
+        <p:cNvGrpSpPr/>
+        <p:nvPr/>
+      </p:nvGrpSpPr>
+      <p:grpSpPr>
+        <a:xfrm>
+          <a:off x="0" y="0"/>
+          <a:ext cx="0" cy="0"/>
+          <a:chOff x="0" y="0"/>
+          <a:chExt cx="0" cy="0"/>
+        </a:xfrm>
+      </p:grpSpPr>
+      <p:sp>
+        <p:nvSpPr>
+          <p:cNvPr id="2" name="Rectangle 1"/>
+          <p:cNvSpPr/>
+          <p:nvPr/>
+        </p:nvSpPr>
+        <p:spPr>
+          <a:xfrm>
+            <a:off x="851620" y="240995"/>
+            <a:ext cx="890026" cy="296675"/>
+          </a:xfrm>
+          <a:prstGeom prst="rect">
+            <a:avLst/>
+          </a:prstGeom>
+          <a:solidFill>
+            <a:srgbClr val="A6CEE3"/>
+          </a:solidFill>
+          <a:ln w="12700">
+            <a:solidFill>
+              <a:schemeClr val="tx1"/>
+            </a:solidFill>
+          </a:ln>
+        </p:spPr>
+        <p:style>
+          <a:lnRef idx="2">
+            <a:schemeClr val="accent1">
+              <a:shade val="50000"/>
+            </a:schemeClr>
+          </a:lnRef>
+          <a:fillRef idx="1">
+            <a:schemeClr val="accent1"/>
+          </a:fillRef>
+          <a:effectRef idx="0">
+            <a:schemeClr val="accent1"/>
+          </a:effectRef>
+          <a:fontRef idx="minor">
+            <a:schemeClr val="lt1"/>
+          </a:fontRef>
+        </p:style>
+        <p:txBody>
+          <a:bodyPr rtlCol="0" anchor="ctr"/>
+          <a:lstStyle/>
+          <a:p>
+            <a:pPr algn="ctr"/>
+            <a:r>
+              <a:rPr lang="en-US" sz="800" dirty="0" smtClean="0">
+                <a:solidFill>
+                  <a:schemeClr val="tx1"/>
+                </a:solidFill>
+                <a:latin typeface="Arial" pitchFamily="34" charset="0"/>
+                <a:cs typeface="Arial" pitchFamily="34" charset="0"/>
+              </a:rPr>
+              <a:t>0.0</a:t>
+            </a:r>
+          </a:p>
+          <a:p>
+            <a:pPr algn="ctr"/>
+            <a:r>
+              <a:rPr lang="en-US" sz="800" dirty="0" smtClean="0">
+                <a:solidFill>
+                  <a:schemeClr val="tx1"/>
+                </a:solidFill>
+                <a:latin typeface="Arial" pitchFamily="34" charset="0"/>
+                <a:cs typeface="Arial" pitchFamily="34" charset="0"/>
+              </a:rPr>
+              <a:t>c0.0_min = 2</a:t>
+            </a:r>
+            <a:endParaRPr lang="en-US" sz="800" dirty="0">
+              <a:solidFill>
+                <a:schemeClr val="tx1"/>
+              </a:solidFill>
+              <a:latin typeface="Arial" pitchFamily="34" charset="0"/>
+              <a:cs typeface="Arial" pitchFamily="34" charset="0"/>
+            </a:endParaRPr>
+          </a:p>
+        </p:txBody>
+      </p:sp>
+      <p:sp>
+        <p:nvSpPr>
+          <p:cNvPr id="3" name="Rectangle 2"/>
+          <p:cNvSpPr/>
+          <p:nvPr/>
+        </p:nvSpPr>
+        <p:spPr>
+          <a:xfrm>
+            <a:off x="1519138" y="1358667"/>
+            <a:ext cx="890026" cy="296675"/>
+          </a:xfrm>
+          <a:prstGeom prst="rect">
+            <a:avLst/>
+          </a:prstGeom>
+          <a:solidFill>
+            <a:srgbClr val="A6CEE3"/>
+          </a:solidFill>
+          <a:ln w="12700">
+            <a:solidFill>
+              <a:schemeClr val="tx1"/>
+            </a:solidFill>
+          </a:ln>
+        </p:spPr>
+        <p:style>
+          <a:lnRef idx="2">
+            <a:schemeClr val="accent1">
+              <a:shade val="50000"/>
+            </a:schemeClr>
+          </a:lnRef>
+          <a:fillRef idx="1">
+            <a:schemeClr val="accent1"/>
+          </a:fillRef>
+          <a:effectRef idx="0">
+            <a:schemeClr val="accent1"/>
+          </a:effectRef>
+          <a:fontRef idx="minor">
+            <a:schemeClr val="lt1"/>
+          </a:fontRef>
+        </p:style>
+        <p:txBody>
+          <a:bodyPr rtlCol="0" anchor="ctr"/>
+          <a:lstStyle/>
+          <a:p>
+            <a:pPr algn="ctr"/>
+            <a:r>
+              <a:rPr lang="en-US" sz="800" dirty="0" smtClean="0">
+                <a:solidFill>
+                  <a:schemeClr val="tx1"/>
+                </a:solidFill>
+                <a:latin typeface="Arial" pitchFamily="34" charset="0"/>
+                <a:cs typeface="Arial" pitchFamily="34" charset="0"/>
+              </a:rPr>
+              <a:t>2.0</a:t>
+            </a:r>
+          </a:p>
+          <a:p>
+            <a:pPr algn="ctr"/>
+            <a:r>
+              <a:rPr lang="en-US" sz="800" dirty="0" smtClean="0">
+                <a:solidFill>
+                  <a:schemeClr val="tx1"/>
+                </a:solidFill>
+                <a:latin typeface="Arial" pitchFamily="34" charset="0"/>
+                <a:cs typeface="Arial" pitchFamily="34" charset="0"/>
+              </a:rPr>
+              <a:t>c2.0_min = 3</a:t>
+            </a:r>
+            <a:endParaRPr lang="en-US" sz="800" dirty="0">
+              <a:solidFill>
+                <a:schemeClr val="tx1"/>
+              </a:solidFill>
+              <a:latin typeface="Arial" pitchFamily="34" charset="0"/>
+              <a:cs typeface="Arial" pitchFamily="34" charset="0"/>
+            </a:endParaRPr>
+          </a:p>
+        </p:txBody>
+      </p:sp>
+      <p:sp>
+        <p:nvSpPr>
+          <p:cNvPr id="4" name="Rectangle 3"/>
+          <p:cNvSpPr/>
+          <p:nvPr/>
+        </p:nvSpPr>
+        <p:spPr>
+          <a:xfrm>
+            <a:off x="182562" y="1358667"/>
+            <a:ext cx="890026" cy="296675"/>
+          </a:xfrm>
+          <a:prstGeom prst="rect">
+            <a:avLst/>
+          </a:prstGeom>
+          <a:solidFill>
+            <a:srgbClr val="FFFFCC"/>
+          </a:solidFill>
+          <a:ln w="12700">
+            <a:solidFill>
+              <a:schemeClr val="tx1"/>
+            </a:solidFill>
+          </a:ln>
+        </p:spPr>
+        <p:style>
+          <a:lnRef idx="2">
+            <a:schemeClr val="accent1">
+              <a:shade val="50000"/>
+            </a:schemeClr>
+          </a:lnRef>
+          <a:fillRef idx="1">
+            <a:schemeClr val="accent1"/>
+          </a:fillRef>
+          <a:effectRef idx="0">
+            <a:schemeClr val="accent1"/>
+          </a:effectRef>
+          <a:fontRef idx="minor">
+            <a:schemeClr val="lt1"/>
+          </a:fontRef>
+        </p:style>
+        <p:txBody>
+          <a:bodyPr rtlCol="0" anchor="ctr"/>
+          <a:lstStyle/>
+          <a:p>
+            <a:pPr algn="ctr"/>
+            <a:r>
+              <a:rPr lang="en-US" sz="800" dirty="0" smtClean="0">
+                <a:solidFill>
+                  <a:schemeClr val="tx1"/>
+                </a:solidFill>
+                <a:latin typeface="Arial" pitchFamily="34" charset="0"/>
+                <a:cs typeface="Arial" pitchFamily="34" charset="0"/>
+              </a:rPr>
+              <a:t>1.0</a:t>
+            </a:r>
+          </a:p>
+          <a:p>
+            <a:pPr algn="ctr"/>
+            <a:r>
+              <a:rPr lang="en-US" sz="800" dirty="0" smtClean="0">
+                <a:solidFill>
+                  <a:schemeClr val="tx1"/>
+                </a:solidFill>
+                <a:latin typeface="Arial" pitchFamily="34" charset="0"/>
+                <a:cs typeface="Arial" pitchFamily="34" charset="0"/>
+              </a:rPr>
+              <a:t>c1.0_min = 5</a:t>
+            </a:r>
+            <a:endParaRPr lang="en-US" sz="800" dirty="0">
+              <a:solidFill>
+                <a:schemeClr val="tx1"/>
+              </a:solidFill>
+              <a:latin typeface="Arial" pitchFamily="34" charset="0"/>
+              <a:cs typeface="Arial" pitchFamily="34" charset="0"/>
+            </a:endParaRPr>
+          </a:p>
+        </p:txBody>
+      </p:sp>
+      <p:sp>
+        <p:nvSpPr>
+          <p:cNvPr id="5" name="Rectangle 4"/>
+          <p:cNvSpPr/>
+          <p:nvPr/>
+        </p:nvSpPr>
+        <p:spPr>
+          <a:xfrm>
+            <a:off x="851620" y="2437375"/>
+            <a:ext cx="890026" cy="296675"/>
+          </a:xfrm>
+          <a:prstGeom prst="rect">
+            <a:avLst/>
+          </a:prstGeom>
+          <a:solidFill>
+            <a:srgbClr val="A6CEE3"/>
+          </a:solidFill>
+          <a:ln w="12700">
+            <a:solidFill>
+              <a:schemeClr val="tx1"/>
+            </a:solidFill>
+          </a:ln>
+        </p:spPr>
+        <p:style>
+          <a:lnRef idx="2">
+            <a:schemeClr val="accent1">
+              <a:shade val="50000"/>
+            </a:schemeClr>
+          </a:lnRef>
+          <a:fillRef idx="1">
+            <a:schemeClr val="accent1"/>
+          </a:fillRef>
+          <a:effectRef idx="0">
+            <a:schemeClr val="accent1"/>
+          </a:effectRef>
+          <a:fontRef idx="minor">
+            <a:schemeClr val="lt1"/>
+          </a:fontRef>
+        </p:style>
+        <p:txBody>
+          <a:bodyPr rtlCol="0" anchor="ctr"/>
+          <a:lstStyle/>
+          <a:p>
+            <a:pPr algn="ctr"/>
+            <a:r>
+              <a:rPr lang="en-US" sz="800" dirty="0" smtClean="0">
+                <a:solidFill>
+                  <a:schemeClr val="tx1"/>
+                </a:solidFill>
+                <a:latin typeface="Arial" pitchFamily="34" charset="0"/>
+                <a:cs typeface="Arial" pitchFamily="34" charset="0"/>
+              </a:rPr>
+              <a:t>3.0</a:t>
+            </a:r>
+          </a:p>
+          <a:p>
+            <a:pPr algn="ctr"/>
+            <a:r>
+              <a:rPr lang="en-US" sz="800" smtClean="0">
+                <a:solidFill>
+                  <a:schemeClr val="tx1"/>
+                </a:solidFill>
+                <a:latin typeface="Arial" pitchFamily="34" charset="0"/>
+                <a:cs typeface="Arial" pitchFamily="34" charset="0"/>
+              </a:rPr>
+              <a:t>c3.0_min </a:t>
+            </a:r>
+            <a:r>
+              <a:rPr lang="en-US" sz="800" dirty="0" smtClean="0">
+                <a:solidFill>
+                  <a:schemeClr val="tx1"/>
+                </a:solidFill>
+                <a:latin typeface="Arial" pitchFamily="34" charset="0"/>
+                <a:cs typeface="Arial" pitchFamily="34" charset="0"/>
+              </a:rPr>
+              <a:t>= 4</a:t>
+            </a:r>
+            <a:endParaRPr lang="en-US" sz="800" dirty="0">
+              <a:solidFill>
+                <a:schemeClr val="tx1"/>
+              </a:solidFill>
+              <a:latin typeface="Arial" pitchFamily="34" charset="0"/>
+              <a:cs typeface="Arial" pitchFamily="34" charset="0"/>
+            </a:endParaRPr>
+          </a:p>
+        </p:txBody>
+      </p:sp>
+      <p:cxnSp>
+        <p:nvCxnSpPr>
+          <p:cNvPr id="6" name="Straight Arrow Connector 5"/>
+          <p:cNvCxnSpPr>
+            <a:stCxn id="11" idx="2"/>
+            <a:endCxn id="3" idx="0"/>
+          </p:cNvCxnSpPr>
+          <p:nvPr/>
+        </p:nvCxnSpPr>
+        <p:spPr>
+          <a:xfrm>
+            <a:off x="1296633" y="1072070"/>
+            <a:ext cx="667518" cy="286597"/>
+          </a:xfrm>
+          <a:prstGeom prst="straightConnector1">
+            <a:avLst/>
+          </a:prstGeom>
+          <a:ln w="12700">
+            <a:solidFill>
+              <a:schemeClr val="tx1"/>
+            </a:solidFill>
+            <a:tailEnd type="triangle"/>
+          </a:ln>
+        </p:spPr>
+        <p:style>
+          <a:lnRef idx="1">
+            <a:schemeClr val="accent1"/>
+          </a:lnRef>
+          <a:fillRef idx="0">
+            <a:schemeClr val="accent1"/>
+          </a:fillRef>
+          <a:effectRef idx="0">
+            <a:schemeClr val="accent1"/>
+          </a:effectRef>
+          <a:fontRef idx="minor">
+            <a:schemeClr val="tx1"/>
+          </a:fontRef>
+        </p:style>
+      </p:cxnSp>
+      <p:cxnSp>
+        <p:nvCxnSpPr>
+          <p:cNvPr id="7" name="Straight Arrow Connector 6"/>
+          <p:cNvCxnSpPr>
+            <a:stCxn id="11" idx="2"/>
+            <a:endCxn id="4" idx="0"/>
+          </p:cNvCxnSpPr>
+          <p:nvPr/>
+        </p:nvCxnSpPr>
+        <p:spPr>
+          <a:xfrm flipH="1">
+            <a:off x="627575" y="1072070"/>
+            <a:ext cx="669058" cy="286597"/>
+          </a:xfrm>
+          <a:prstGeom prst="straightConnector1">
+            <a:avLst/>
+          </a:prstGeom>
+          <a:ln w="12700">
+            <a:solidFill>
+              <a:schemeClr val="tx1"/>
+            </a:solidFill>
+            <a:tailEnd type="triangle"/>
+          </a:ln>
+        </p:spPr>
+        <p:style>
+          <a:lnRef idx="1">
+            <a:schemeClr val="accent1"/>
+          </a:lnRef>
+          <a:fillRef idx="0">
+            <a:schemeClr val="accent1"/>
+          </a:fillRef>
+          <a:effectRef idx="0">
+            <a:schemeClr val="accent1"/>
+          </a:effectRef>
+          <a:fontRef idx="minor">
+            <a:schemeClr val="tx1"/>
+          </a:fontRef>
+        </p:style>
+      </p:cxnSp>
+      <p:cxnSp>
+        <p:nvCxnSpPr>
+          <p:cNvPr id="8" name="Straight Arrow Connector 7"/>
+          <p:cNvCxnSpPr>
+            <a:stCxn id="4" idx="2"/>
+            <a:endCxn id="5" idx="0"/>
+          </p:cNvCxnSpPr>
+          <p:nvPr/>
+        </p:nvCxnSpPr>
+        <p:spPr>
+          <a:xfrm>
+            <a:off x="627575" y="1655342"/>
+            <a:ext cx="669058" cy="782033"/>
+          </a:xfrm>
+          <a:prstGeom prst="straightConnector1">
+            <a:avLst/>
+          </a:prstGeom>
+          <a:ln w="12700">
+            <a:solidFill>
+              <a:schemeClr val="tx1"/>
+            </a:solidFill>
+            <a:tailEnd type="triangle"/>
+          </a:ln>
+        </p:spPr>
+        <p:style>
+          <a:lnRef idx="1">
+            <a:schemeClr val="accent1"/>
+          </a:lnRef>
+          <a:fillRef idx="0">
+            <a:schemeClr val="accent1"/>
+          </a:fillRef>
+          <a:effectRef idx="0">
+            <a:schemeClr val="accent1"/>
+          </a:effectRef>
+          <a:fontRef idx="minor">
+            <a:schemeClr val="tx1"/>
+          </a:fontRef>
+        </p:style>
+      </p:cxnSp>
+      <p:cxnSp>
+        <p:nvCxnSpPr>
+          <p:cNvPr id="9" name="Straight Arrow Connector 8"/>
+          <p:cNvCxnSpPr>
+            <a:stCxn id="5" idx="2"/>
+          </p:cNvCxnSpPr>
+          <p:nvPr/>
+        </p:nvCxnSpPr>
+        <p:spPr>
+          <a:xfrm flipH="1">
+            <a:off x="1296631" y="2734050"/>
+            <a:ext cx="2" cy="192025"/>
+          </a:xfrm>
+          <a:prstGeom prst="straightConnector1">
+            <a:avLst/>
+          </a:prstGeom>
+          <a:ln w="12700">
+            <a:solidFill>
+              <a:schemeClr val="tx1"/>
+            </a:solidFill>
+            <a:tailEnd type="triangle"/>
+          </a:ln>
+        </p:spPr>
+        <p:style>
+          <a:lnRef idx="1">
+            <a:schemeClr val="accent1"/>
+          </a:lnRef>
+          <a:fillRef idx="0">
+            <a:schemeClr val="accent1"/>
+          </a:fillRef>
+          <a:effectRef idx="0">
+            <a:schemeClr val="accent1"/>
+          </a:effectRef>
+          <a:fontRef idx="minor">
+            <a:schemeClr val="tx1"/>
+          </a:fontRef>
+        </p:style>
+      </p:cxnSp>
+      <p:cxnSp>
+        <p:nvCxnSpPr>
+          <p:cNvPr id="10" name="Straight Arrow Connector 9"/>
+          <p:cNvCxnSpPr>
+            <a:endCxn id="2" idx="0"/>
+          </p:cNvCxnSpPr>
+          <p:nvPr/>
+        </p:nvCxnSpPr>
+        <p:spPr>
+          <a:xfrm>
+            <a:off x="1296633" y="42772"/>
+            <a:ext cx="0" cy="198223"/>
+          </a:xfrm>
+          <a:prstGeom prst="straightConnector1">
+            <a:avLst/>
+          </a:prstGeom>
+          <a:ln w="12700">
+            <a:solidFill>
+              <a:schemeClr val="tx1"/>
+            </a:solidFill>
+            <a:tailEnd type="triangle"/>
+          </a:ln>
+        </p:spPr>
+        <p:style>
+          <a:lnRef idx="1">
+            <a:schemeClr val="accent1"/>
+          </a:lnRef>
+          <a:fillRef idx="0">
+            <a:schemeClr val="accent1"/>
+          </a:fillRef>
+          <a:effectRef idx="0">
+            <a:schemeClr val="accent1"/>
+          </a:effectRef>
+          <a:fontRef idx="minor">
+            <a:schemeClr val="tx1"/>
+          </a:fontRef>
+        </p:style>
+      </p:cxnSp>
+      <p:sp>
+        <p:nvSpPr>
+          <p:cNvPr id="11" name="Rectangle 10"/>
+          <p:cNvSpPr/>
+          <p:nvPr/>
+        </p:nvSpPr>
+        <p:spPr>
+          <a:xfrm>
+            <a:off x="851620" y="775395"/>
+            <a:ext cx="890026" cy="296675"/>
+          </a:xfrm>
+          <a:prstGeom prst="rect">
+            <a:avLst/>
+          </a:prstGeom>
+          <a:solidFill>
+            <a:srgbClr val="FFFFCC"/>
+          </a:solidFill>
+          <a:ln w="12700">
+            <a:solidFill>
+              <a:schemeClr val="tx1"/>
+            </a:solidFill>
+          </a:ln>
+        </p:spPr>
+        <p:style>
+          <a:lnRef idx="2">
+            <a:schemeClr val="accent1">
+              <a:shade val="50000"/>
+            </a:schemeClr>
+          </a:lnRef>
+          <a:fillRef idx="1">
+            <a:schemeClr val="accent1"/>
+          </a:fillRef>
+          <a:effectRef idx="0">
+            <a:schemeClr val="accent1"/>
+          </a:effectRef>
+          <a:fontRef idx="minor">
+            <a:schemeClr val="lt1"/>
+          </a:fontRef>
+        </p:style>
+        <p:txBody>
+          <a:bodyPr rtlCol="0" anchor="ctr"/>
+          <a:lstStyle/>
+          <a:p>
+            <a:pPr algn="ctr"/>
+            <a:r>
+              <a:rPr lang="en-US" sz="800" dirty="0" smtClean="0">
+                <a:solidFill>
+                  <a:schemeClr val="tx1"/>
+                </a:solidFill>
+                <a:latin typeface="Arial" pitchFamily="34" charset="0"/>
+                <a:cs typeface="Arial" pitchFamily="34" charset="0"/>
+              </a:rPr>
+              <a:t>0.1</a:t>
+            </a:r>
+          </a:p>
+          <a:p>
+            <a:pPr algn="ctr"/>
+            <a:r>
+              <a:rPr lang="en-US" sz="800" dirty="0" smtClean="0">
+                <a:solidFill>
+                  <a:schemeClr val="tx1"/>
+                </a:solidFill>
+                <a:latin typeface="Arial" pitchFamily="34" charset="0"/>
+                <a:cs typeface="Arial" pitchFamily="34" charset="0"/>
+              </a:rPr>
+              <a:t>c0.1_min = 2</a:t>
+            </a:r>
+            <a:endParaRPr lang="en-US" sz="800" dirty="0">
+              <a:solidFill>
+                <a:schemeClr val="tx1"/>
+              </a:solidFill>
+              <a:latin typeface="Arial" pitchFamily="34" charset="0"/>
+              <a:cs typeface="Arial" pitchFamily="34" charset="0"/>
+            </a:endParaRPr>
+          </a:p>
+        </p:txBody>
+      </p:sp>
+      <p:cxnSp>
+        <p:nvCxnSpPr>
+          <p:cNvPr id="12" name="Straight Arrow Connector 11"/>
+          <p:cNvCxnSpPr>
+            <a:stCxn id="2" idx="2"/>
+            <a:endCxn id="11" idx="0"/>
+          </p:cNvCxnSpPr>
+          <p:nvPr/>
+        </p:nvCxnSpPr>
+        <p:spPr>
+          <a:xfrm>
+            <a:off x="1296633" y="537670"/>
+            <a:ext cx="0" cy="237725"/>
+          </a:xfrm>
+          <a:prstGeom prst="straightConnector1">
+            <a:avLst/>
+          </a:prstGeom>
+          <a:ln w="12700">
+            <a:solidFill>
+              <a:schemeClr val="tx1"/>
+            </a:solidFill>
+            <a:tailEnd type="triangle"/>
+          </a:ln>
+        </p:spPr>
+        <p:style>
+          <a:lnRef idx="1">
+            <a:schemeClr val="accent1"/>
+          </a:lnRef>
+          <a:fillRef idx="0">
+            <a:schemeClr val="accent1"/>
+          </a:fillRef>
+          <a:effectRef idx="0">
+            <a:schemeClr val="accent1"/>
+          </a:effectRef>
+          <a:fontRef idx="minor">
+            <a:schemeClr val="tx1"/>
+          </a:fontRef>
+        </p:style>
+      </p:cxnSp>
+      <p:sp>
+        <p:nvSpPr>
+          <p:cNvPr id="13" name="Rectangle 12"/>
+          <p:cNvSpPr/>
+          <p:nvPr/>
+        </p:nvSpPr>
+        <p:spPr>
+          <a:xfrm>
+            <a:off x="1519138" y="1850735"/>
+            <a:ext cx="890026" cy="296675"/>
+          </a:xfrm>
+          <a:prstGeom prst="rect">
+            <a:avLst/>
+          </a:prstGeom>
+          <a:solidFill>
+            <a:srgbClr val="FFFFCC"/>
+          </a:solidFill>
+          <a:ln w="12700">
+            <a:solidFill>
+              <a:schemeClr val="tx1"/>
+            </a:solidFill>
+          </a:ln>
+        </p:spPr>
+        <p:style>
+          <a:lnRef idx="2">
+            <a:schemeClr val="accent1">
+              <a:shade val="50000"/>
+            </a:schemeClr>
+          </a:lnRef>
+          <a:fillRef idx="1">
+            <a:schemeClr val="accent1"/>
+          </a:fillRef>
+          <a:effectRef idx="0">
+            <a:schemeClr val="accent1"/>
+          </a:effectRef>
+          <a:fontRef idx="minor">
+            <a:schemeClr val="lt1"/>
+          </a:fontRef>
+        </p:style>
+        <p:txBody>
+          <a:bodyPr rtlCol="0" anchor="ctr"/>
+          <a:lstStyle/>
+          <a:p>
+            <a:pPr algn="ctr"/>
+            <a:r>
+              <a:rPr lang="en-US" sz="800" dirty="0">
+                <a:solidFill>
+                  <a:schemeClr val="tx1"/>
+                </a:solidFill>
+                <a:latin typeface="Arial" pitchFamily="34" charset="0"/>
+                <a:cs typeface="Arial" pitchFamily="34" charset="0"/>
+              </a:rPr>
+              <a:t>2</a:t>
+            </a:r>
+            <a:r>
+              <a:rPr lang="en-US" sz="800" dirty="0" smtClean="0">
+                <a:solidFill>
+                  <a:schemeClr val="tx1"/>
+                </a:solidFill>
+                <a:latin typeface="Arial" pitchFamily="34" charset="0"/>
+                <a:cs typeface="Arial" pitchFamily="34" charset="0"/>
+              </a:rPr>
+              <a:t>.1</a:t>
+            </a:r>
+          </a:p>
+          <a:p>
+            <a:pPr algn="ctr"/>
+            <a:r>
+              <a:rPr lang="en-US" sz="800" dirty="0" smtClean="0">
+                <a:solidFill>
+                  <a:schemeClr val="tx1"/>
+                </a:solidFill>
+                <a:latin typeface="Arial" pitchFamily="34" charset="0"/>
+                <a:cs typeface="Arial" pitchFamily="34" charset="0"/>
+              </a:rPr>
+              <a:t>c2.1_min = 1</a:t>
+            </a:r>
+            <a:endParaRPr lang="en-US" sz="800" dirty="0">
+              <a:solidFill>
+                <a:schemeClr val="tx1"/>
+              </a:solidFill>
+              <a:latin typeface="Arial" pitchFamily="34" charset="0"/>
+              <a:cs typeface="Arial" pitchFamily="34" charset="0"/>
+            </a:endParaRPr>
+          </a:p>
+        </p:txBody>
+      </p:sp>
+      <p:cxnSp>
+        <p:nvCxnSpPr>
+          <p:cNvPr id="14" name="Straight Arrow Connector 13"/>
+          <p:cNvCxnSpPr>
+            <a:stCxn id="3" idx="2"/>
+            <a:endCxn id="13" idx="0"/>
+          </p:cNvCxnSpPr>
+          <p:nvPr/>
+        </p:nvCxnSpPr>
+        <p:spPr>
+          <a:xfrm>
+            <a:off x="1964151" y="1655342"/>
+            <a:ext cx="0" cy="195393"/>
+          </a:xfrm>
+          <a:prstGeom prst="straightConnector1">
+            <a:avLst/>
+          </a:prstGeom>
+          <a:ln w="12700">
+            <a:solidFill>
+              <a:schemeClr val="tx1"/>
+            </a:solidFill>
+            <a:tailEnd type="triangle"/>
+          </a:ln>
+        </p:spPr>
+        <p:style>
+          <a:lnRef idx="1">
+            <a:schemeClr val="accent1"/>
+          </a:lnRef>
+          <a:fillRef idx="0">
+            <a:schemeClr val="accent1"/>
+          </a:fillRef>
+          <a:effectRef idx="0">
+            <a:schemeClr val="accent1"/>
+          </a:effectRef>
+          <a:fontRef idx="minor">
+            <a:schemeClr val="tx1"/>
+          </a:fontRef>
+        </p:style>
+      </p:cxnSp>
+      <p:cxnSp>
+        <p:nvCxnSpPr>
+          <p:cNvPr id="15" name="Straight Arrow Connector 14"/>
+          <p:cNvCxnSpPr>
+            <a:stCxn id="13" idx="2"/>
+            <a:endCxn id="5" idx="0"/>
+          </p:cNvCxnSpPr>
+          <p:nvPr/>
+        </p:nvCxnSpPr>
+        <p:spPr>
+          <a:xfrm flipH="1">
+            <a:off x="1296633" y="2147410"/>
+            <a:ext cx="667518" cy="289965"/>
+          </a:xfrm>
+          <a:prstGeom prst="straightConnector1">
+            <a:avLst/>
+          </a:prstGeom>
+          <a:ln w="12700">
+            <a:solidFill>
+              <a:schemeClr val="tx1"/>
+            </a:solidFill>
+            <a:tailEnd type="triangle"/>
           </a:ln>
         </p:spPr>
         <p:style>
@@ -7172,7 +9233,577 @@
     </p:spTree>
     <p:extLst>
       <p:ext uri="{BB962C8B-B14F-4D97-AF65-F5344CB8AC3E}">
-        <p14:creationId xmlns:p14="http://schemas.microsoft.com/office/powerpoint/2010/main" val="3985344424"/>
+        <p14:creationId xmlns:p14="http://schemas.microsoft.com/office/powerpoint/2010/main" val="3089994294"/>
+      </p:ext>
+    </p:extLst>
+  </p:cSld>
+  <p:clrMapOvr>
+    <a:masterClrMapping/>
+  </p:clrMapOvr>
+</p:sld>
+</file>
+
+<file path=ppt/slides/slide7.xml><?xml version="1.0" encoding="utf-8"?>
+<p:sld xmlns:a="http://schemas.openxmlformats.org/drawingml/2006/main" xmlns:r="http://schemas.openxmlformats.org/officeDocument/2006/relationships" xmlns:p="http://schemas.openxmlformats.org/presentationml/2006/main">
+  <p:cSld>
+    <p:spTree>
+      <p:nvGrpSpPr>
+        <p:cNvPr id="1" name=""/>
+        <p:cNvGrpSpPr/>
+        <p:nvPr/>
+      </p:nvGrpSpPr>
+      <p:grpSpPr>
+        <a:xfrm>
+          <a:off x="0" y="0"/>
+          <a:ext cx="0" cy="0"/>
+          <a:chOff x="0" y="0"/>
+          <a:chExt cx="0" cy="0"/>
+        </a:xfrm>
+      </p:grpSpPr>
+      <p:sp>
+        <p:nvSpPr>
+          <p:cNvPr id="2" name="Rectangle 1"/>
+          <p:cNvSpPr/>
+          <p:nvPr/>
+        </p:nvSpPr>
+        <p:spPr>
+          <a:xfrm>
+            <a:off x="836668" y="187755"/>
+            <a:ext cx="890025" cy="296675"/>
+          </a:xfrm>
+          <a:prstGeom prst="rect">
+            <a:avLst/>
+          </a:prstGeom>
+          <a:solidFill>
+            <a:srgbClr val="FFFFCC"/>
+          </a:solidFill>
+          <a:ln w="12700">
+            <a:solidFill>
+              <a:schemeClr val="tx1"/>
+            </a:solidFill>
+          </a:ln>
+        </p:spPr>
+        <p:style>
+          <a:lnRef idx="2">
+            <a:schemeClr val="accent1">
+              <a:shade val="50000"/>
+            </a:schemeClr>
+          </a:lnRef>
+          <a:fillRef idx="1">
+            <a:schemeClr val="accent1"/>
+          </a:fillRef>
+          <a:effectRef idx="0">
+            <a:schemeClr val="accent1"/>
+          </a:effectRef>
+          <a:fontRef idx="minor">
+            <a:schemeClr val="lt1"/>
+          </a:fontRef>
+        </p:style>
+        <p:txBody>
+          <a:bodyPr rtlCol="0" anchor="ctr"/>
+          <a:lstStyle/>
+          <a:p>
+            <a:pPr algn="ctr"/>
+            <a:r>
+              <a:rPr lang="en-US" sz="800" dirty="0" smtClean="0">
+                <a:solidFill>
+                  <a:schemeClr val="tx1"/>
+                </a:solidFill>
+                <a:latin typeface="Arial" pitchFamily="34" charset="0"/>
+                <a:cs typeface="Arial" pitchFamily="34" charset="0"/>
+              </a:rPr>
+              <a:t>0</a:t>
+            </a:r>
+          </a:p>
+          <a:p>
+            <a:pPr algn="ctr"/>
+            <a:r>
+              <a:rPr lang="en-US" sz="800" dirty="0" smtClean="0">
+                <a:solidFill>
+                  <a:schemeClr val="tx1"/>
+                </a:solidFill>
+                <a:latin typeface="Arial" pitchFamily="34" charset="0"/>
+                <a:cs typeface="Arial" pitchFamily="34" charset="0"/>
+              </a:rPr>
+              <a:t>c0_max = 5</a:t>
+            </a:r>
+            <a:endParaRPr lang="en-US" sz="800" dirty="0">
+              <a:solidFill>
+                <a:schemeClr val="tx1"/>
+              </a:solidFill>
+              <a:latin typeface="Arial" pitchFamily="34" charset="0"/>
+              <a:cs typeface="Arial" pitchFamily="34" charset="0"/>
+            </a:endParaRPr>
+          </a:p>
+        </p:txBody>
+      </p:sp>
+      <p:sp>
+        <p:nvSpPr>
+          <p:cNvPr id="3" name="Rectangle 2"/>
+          <p:cNvSpPr/>
+          <p:nvPr/>
+        </p:nvSpPr>
+        <p:spPr>
+          <a:xfrm>
+            <a:off x="258762" y="824365"/>
+            <a:ext cx="890025" cy="296675"/>
+          </a:xfrm>
+          <a:prstGeom prst="rect">
+            <a:avLst/>
+          </a:prstGeom>
+          <a:solidFill>
+            <a:srgbClr val="FFFFCC"/>
+          </a:solidFill>
+          <a:ln w="12700">
+            <a:solidFill>
+              <a:schemeClr val="tx1"/>
+            </a:solidFill>
+          </a:ln>
+        </p:spPr>
+        <p:style>
+          <a:lnRef idx="2">
+            <a:schemeClr val="accent1">
+              <a:shade val="50000"/>
+            </a:schemeClr>
+          </a:lnRef>
+          <a:fillRef idx="1">
+            <a:schemeClr val="accent1"/>
+          </a:fillRef>
+          <a:effectRef idx="0">
+            <a:schemeClr val="accent1"/>
+          </a:effectRef>
+          <a:fontRef idx="minor">
+            <a:schemeClr val="lt1"/>
+          </a:fontRef>
+        </p:style>
+        <p:txBody>
+          <a:bodyPr rtlCol="0" anchor="ctr"/>
+          <a:lstStyle/>
+          <a:p>
+            <a:pPr algn="ctr"/>
+            <a:r>
+              <a:rPr lang="en-US" sz="800" dirty="0" smtClean="0">
+                <a:solidFill>
+                  <a:schemeClr val="tx1"/>
+                </a:solidFill>
+                <a:latin typeface="Arial" pitchFamily="34" charset="0"/>
+                <a:cs typeface="Arial" pitchFamily="34" charset="0"/>
+              </a:rPr>
+              <a:t>1</a:t>
+            </a:r>
+          </a:p>
+          <a:p>
+            <a:pPr algn="ctr"/>
+            <a:r>
+              <a:rPr lang="en-US" sz="800" dirty="0" smtClean="0">
+                <a:solidFill>
+                  <a:schemeClr val="tx1"/>
+                </a:solidFill>
+                <a:latin typeface="Arial" pitchFamily="34" charset="0"/>
+                <a:cs typeface="Arial" pitchFamily="34" charset="0"/>
+              </a:rPr>
+              <a:t>c1_max = 4</a:t>
+            </a:r>
+            <a:endParaRPr lang="en-US" sz="800" dirty="0">
+              <a:solidFill>
+                <a:schemeClr val="tx1"/>
+              </a:solidFill>
+              <a:latin typeface="Arial" pitchFamily="34" charset="0"/>
+              <a:cs typeface="Arial" pitchFamily="34" charset="0"/>
+            </a:endParaRPr>
+          </a:p>
+        </p:txBody>
+      </p:sp>
+      <p:sp>
+        <p:nvSpPr>
+          <p:cNvPr id="4" name="Rectangle 3"/>
+          <p:cNvSpPr/>
+          <p:nvPr/>
+        </p:nvSpPr>
+        <p:spPr>
+          <a:xfrm>
+            <a:off x="1447334" y="824365"/>
+            <a:ext cx="890025" cy="296675"/>
+          </a:xfrm>
+          <a:prstGeom prst="rect">
+            <a:avLst/>
+          </a:prstGeom>
+          <a:solidFill>
+            <a:srgbClr val="FFFFCC"/>
+          </a:solidFill>
+          <a:ln w="12700">
+            <a:solidFill>
+              <a:schemeClr val="tx1"/>
+            </a:solidFill>
+          </a:ln>
+        </p:spPr>
+        <p:style>
+          <a:lnRef idx="2">
+            <a:schemeClr val="accent1">
+              <a:shade val="50000"/>
+            </a:schemeClr>
+          </a:lnRef>
+          <a:fillRef idx="1">
+            <a:schemeClr val="accent1"/>
+          </a:fillRef>
+          <a:effectRef idx="0">
+            <a:schemeClr val="accent1"/>
+          </a:effectRef>
+          <a:fontRef idx="minor">
+            <a:schemeClr val="lt1"/>
+          </a:fontRef>
+        </p:style>
+        <p:txBody>
+          <a:bodyPr rtlCol="0" anchor="ctr"/>
+          <a:lstStyle/>
+          <a:p>
+            <a:pPr algn="ctr"/>
+            <a:r>
+              <a:rPr lang="en-US" sz="800" dirty="0" smtClean="0">
+                <a:solidFill>
+                  <a:schemeClr val="tx1"/>
+                </a:solidFill>
+                <a:latin typeface="Arial" pitchFamily="34" charset="0"/>
+                <a:cs typeface="Arial" pitchFamily="34" charset="0"/>
+              </a:rPr>
+              <a:t>2</a:t>
+            </a:r>
+          </a:p>
+          <a:p>
+            <a:pPr algn="ctr"/>
+            <a:r>
+              <a:rPr lang="en-US" sz="800" dirty="0" smtClean="0">
+                <a:solidFill>
+                  <a:schemeClr val="tx1"/>
+                </a:solidFill>
+                <a:latin typeface="Arial" pitchFamily="34" charset="0"/>
+                <a:cs typeface="Arial" pitchFamily="34" charset="0"/>
+              </a:rPr>
+              <a:t>c2_max = 7</a:t>
+            </a:r>
+            <a:endParaRPr lang="en-US" sz="800" dirty="0">
+              <a:solidFill>
+                <a:schemeClr val="tx1"/>
+              </a:solidFill>
+              <a:latin typeface="Arial" pitchFamily="34" charset="0"/>
+              <a:cs typeface="Arial" pitchFamily="34" charset="0"/>
+            </a:endParaRPr>
+          </a:p>
+        </p:txBody>
+      </p:sp>
+      <p:sp>
+        <p:nvSpPr>
+          <p:cNvPr id="5" name="Rectangle 4"/>
+          <p:cNvSpPr/>
+          <p:nvPr/>
+        </p:nvSpPr>
+        <p:spPr>
+          <a:xfrm>
+            <a:off x="836667" y="1428280"/>
+            <a:ext cx="890026" cy="296675"/>
+          </a:xfrm>
+          <a:prstGeom prst="rect">
+            <a:avLst/>
+          </a:prstGeom>
+          <a:solidFill>
+            <a:srgbClr val="FFFFCC"/>
+          </a:solidFill>
+          <a:ln w="12700">
+            <a:solidFill>
+              <a:schemeClr val="tx1"/>
+            </a:solidFill>
+          </a:ln>
+        </p:spPr>
+        <p:style>
+          <a:lnRef idx="2">
+            <a:schemeClr val="accent1">
+              <a:shade val="50000"/>
+            </a:schemeClr>
+          </a:lnRef>
+          <a:fillRef idx="1">
+            <a:schemeClr val="accent1"/>
+          </a:fillRef>
+          <a:effectRef idx="0">
+            <a:schemeClr val="accent1"/>
+          </a:effectRef>
+          <a:fontRef idx="minor">
+            <a:schemeClr val="lt1"/>
+          </a:fontRef>
+        </p:style>
+        <p:txBody>
+          <a:bodyPr rtlCol="0" anchor="ctr"/>
+          <a:lstStyle/>
+          <a:p>
+            <a:pPr algn="ctr"/>
+            <a:r>
+              <a:rPr lang="en-US" sz="800" dirty="0" smtClean="0">
+                <a:solidFill>
+                  <a:schemeClr val="tx1"/>
+                </a:solidFill>
+                <a:latin typeface="Arial" pitchFamily="34" charset="0"/>
+                <a:cs typeface="Arial" pitchFamily="34" charset="0"/>
+              </a:rPr>
+              <a:t>3</a:t>
+            </a:r>
+          </a:p>
+          <a:p>
+            <a:pPr algn="ctr"/>
+            <a:r>
+              <a:rPr lang="en-US" sz="800" dirty="0" smtClean="0">
+                <a:solidFill>
+                  <a:schemeClr val="tx1"/>
+                </a:solidFill>
+                <a:latin typeface="Arial" pitchFamily="34" charset="0"/>
+                <a:cs typeface="Arial" pitchFamily="34" charset="0"/>
+              </a:rPr>
+              <a:t>c3_max = 10</a:t>
+            </a:r>
+            <a:endParaRPr lang="en-US" sz="800" dirty="0">
+              <a:solidFill>
+                <a:schemeClr val="tx1"/>
+              </a:solidFill>
+              <a:latin typeface="Arial" pitchFamily="34" charset="0"/>
+              <a:cs typeface="Arial" pitchFamily="34" charset="0"/>
+            </a:endParaRPr>
+          </a:p>
+        </p:txBody>
+      </p:sp>
+      <p:cxnSp>
+        <p:nvCxnSpPr>
+          <p:cNvPr id="6" name="Straight Arrow Connector 5"/>
+          <p:cNvCxnSpPr>
+            <a:stCxn id="2" idx="2"/>
+            <a:endCxn id="3" idx="0"/>
+          </p:cNvCxnSpPr>
+          <p:nvPr/>
+        </p:nvCxnSpPr>
+        <p:spPr>
+          <a:xfrm flipH="1">
+            <a:off x="703775" y="484430"/>
+            <a:ext cx="577906" cy="339935"/>
+          </a:xfrm>
+          <a:prstGeom prst="straightConnector1">
+            <a:avLst/>
+          </a:prstGeom>
+          <a:ln w="12700">
+            <a:solidFill>
+              <a:schemeClr val="tx1"/>
+            </a:solidFill>
+            <a:tailEnd type="triangle"/>
+          </a:ln>
+        </p:spPr>
+        <p:style>
+          <a:lnRef idx="1">
+            <a:schemeClr val="accent1"/>
+          </a:lnRef>
+          <a:fillRef idx="0">
+            <a:schemeClr val="accent1"/>
+          </a:fillRef>
+          <a:effectRef idx="0">
+            <a:schemeClr val="accent1"/>
+          </a:effectRef>
+          <a:fontRef idx="minor">
+            <a:schemeClr val="tx1"/>
+          </a:fontRef>
+        </p:style>
+      </p:cxnSp>
+      <p:cxnSp>
+        <p:nvCxnSpPr>
+          <p:cNvPr id="7" name="Straight Arrow Connector 6"/>
+          <p:cNvCxnSpPr>
+            <a:stCxn id="2" idx="2"/>
+            <a:endCxn id="4" idx="0"/>
+          </p:cNvCxnSpPr>
+          <p:nvPr/>
+        </p:nvCxnSpPr>
+        <p:spPr>
+          <a:xfrm>
+            <a:off x="1281681" y="484430"/>
+            <a:ext cx="610666" cy="339935"/>
+          </a:xfrm>
+          <a:prstGeom prst="straightConnector1">
+            <a:avLst/>
+          </a:prstGeom>
+          <a:ln w="12700">
+            <a:solidFill>
+              <a:schemeClr val="tx1"/>
+            </a:solidFill>
+            <a:tailEnd type="triangle"/>
+          </a:ln>
+        </p:spPr>
+        <p:style>
+          <a:lnRef idx="1">
+            <a:schemeClr val="accent1"/>
+          </a:lnRef>
+          <a:fillRef idx="0">
+            <a:schemeClr val="accent1"/>
+          </a:fillRef>
+          <a:effectRef idx="0">
+            <a:schemeClr val="accent1"/>
+          </a:effectRef>
+          <a:fontRef idx="minor">
+            <a:schemeClr val="tx1"/>
+          </a:fontRef>
+        </p:style>
+      </p:cxnSp>
+      <p:cxnSp>
+        <p:nvCxnSpPr>
+          <p:cNvPr id="8" name="Straight Arrow Connector 7"/>
+          <p:cNvCxnSpPr>
+            <a:stCxn id="3" idx="2"/>
+            <a:endCxn id="5" idx="0"/>
+          </p:cNvCxnSpPr>
+          <p:nvPr/>
+        </p:nvCxnSpPr>
+        <p:spPr>
+          <a:xfrm>
+            <a:off x="703775" y="1121040"/>
+            <a:ext cx="577905" cy="307240"/>
+          </a:xfrm>
+          <a:prstGeom prst="straightConnector1">
+            <a:avLst/>
+          </a:prstGeom>
+          <a:ln w="12700">
+            <a:solidFill>
+              <a:schemeClr val="tx1"/>
+            </a:solidFill>
+            <a:tailEnd type="triangle"/>
+          </a:ln>
+        </p:spPr>
+        <p:style>
+          <a:lnRef idx="1">
+            <a:schemeClr val="accent1"/>
+          </a:lnRef>
+          <a:fillRef idx="0">
+            <a:schemeClr val="accent1"/>
+          </a:fillRef>
+          <a:effectRef idx="0">
+            <a:schemeClr val="accent1"/>
+          </a:effectRef>
+          <a:fontRef idx="minor">
+            <a:schemeClr val="tx1"/>
+          </a:fontRef>
+        </p:style>
+      </p:cxnSp>
+      <p:cxnSp>
+        <p:nvCxnSpPr>
+          <p:cNvPr id="9" name="Straight Arrow Connector 8"/>
+          <p:cNvCxnSpPr>
+            <a:stCxn id="4" idx="2"/>
+            <a:endCxn id="5" idx="0"/>
+          </p:cNvCxnSpPr>
+          <p:nvPr/>
+        </p:nvCxnSpPr>
+        <p:spPr>
+          <a:xfrm flipH="1">
+            <a:off x="1281680" y="1121040"/>
+            <a:ext cx="610667" cy="307240"/>
+          </a:xfrm>
+          <a:prstGeom prst="straightConnector1">
+            <a:avLst/>
+          </a:prstGeom>
+          <a:ln w="12700">
+            <a:solidFill>
+              <a:schemeClr val="tx1"/>
+            </a:solidFill>
+            <a:tailEnd type="triangle"/>
+          </a:ln>
+        </p:spPr>
+        <p:style>
+          <a:lnRef idx="1">
+            <a:schemeClr val="accent1"/>
+          </a:lnRef>
+          <a:fillRef idx="0">
+            <a:schemeClr val="accent1"/>
+          </a:fillRef>
+          <a:effectRef idx="0">
+            <a:schemeClr val="accent1"/>
+          </a:effectRef>
+          <a:fontRef idx="minor">
+            <a:schemeClr val="tx1"/>
+          </a:fontRef>
+        </p:style>
+      </p:cxnSp>
+      <p:cxnSp>
+        <p:nvCxnSpPr>
+          <p:cNvPr id="10" name="Straight Arrow Connector 9"/>
+          <p:cNvCxnSpPr>
+            <a:stCxn id="5" idx="2"/>
+          </p:cNvCxnSpPr>
+          <p:nvPr/>
+        </p:nvCxnSpPr>
+        <p:spPr>
+          <a:xfrm>
+            <a:off x="1281680" y="1724955"/>
+            <a:ext cx="1" cy="202590"/>
+          </a:xfrm>
+          <a:prstGeom prst="straightConnector1">
+            <a:avLst/>
+          </a:prstGeom>
+          <a:ln w="12700">
+            <a:solidFill>
+              <a:schemeClr val="tx1"/>
+            </a:solidFill>
+            <a:tailEnd type="triangle"/>
+          </a:ln>
+        </p:spPr>
+        <p:style>
+          <a:lnRef idx="1">
+            <a:schemeClr val="accent1"/>
+          </a:lnRef>
+          <a:fillRef idx="0">
+            <a:schemeClr val="accent1"/>
+          </a:fillRef>
+          <a:effectRef idx="0">
+            <a:schemeClr val="accent1"/>
+          </a:effectRef>
+          <a:fontRef idx="minor">
+            <a:schemeClr val="tx1"/>
+          </a:fontRef>
+        </p:style>
+      </p:cxnSp>
+      <p:cxnSp>
+        <p:nvCxnSpPr>
+          <p:cNvPr id="11" name="Straight Arrow Connector 10"/>
+          <p:cNvCxnSpPr>
+            <a:endCxn id="2" idx="0"/>
+          </p:cNvCxnSpPr>
+          <p:nvPr/>
+        </p:nvCxnSpPr>
+        <p:spPr>
+          <a:xfrm>
+            <a:off x="1281681" y="7295"/>
+            <a:ext cx="0" cy="180460"/>
+          </a:xfrm>
+          <a:prstGeom prst="straightConnector1">
+            <a:avLst/>
+          </a:prstGeom>
+          <a:ln w="12700">
+            <a:solidFill>
+              <a:schemeClr val="tx1"/>
+            </a:solidFill>
+            <a:tailEnd type="triangle"/>
+          </a:ln>
+        </p:spPr>
+        <p:style>
+          <a:lnRef idx="1">
+            <a:schemeClr val="accent1"/>
+          </a:lnRef>
+          <a:fillRef idx="0">
+            <a:schemeClr val="accent1"/>
+          </a:fillRef>
+          <a:effectRef idx="0">
+            <a:schemeClr val="accent1"/>
+          </a:effectRef>
+          <a:fontRef idx="minor">
+            <a:schemeClr val="tx1"/>
+          </a:fontRef>
+        </p:style>
+      </p:cxnSp>
+    </p:spTree>
+    <p:extLst>
+      <p:ext uri="{BB962C8B-B14F-4D97-AF65-F5344CB8AC3E}">
+        <p14:creationId xmlns:p14="http://schemas.microsoft.com/office/powerpoint/2010/main" val="652743305"/>
       </p:ext>
     </p:extLst>
   </p:cSld>

</xml_diff>

<commit_message>
Create combined figure for MILP example, including code.
</commit_message>
<xml_diff>
--- a/monitoring_wcet/figs_src/diagrams-narrow.pptx
+++ b/monitoring_wcet/figs_src/diagrams-narrow.pptx
@@ -6695,7 +6695,7 @@
           <a:p>
             <a:pPr algn="ctr"/>
             <a:r>
-              <a:rPr lang="en-US" sz="800" smtClean="0">
+              <a:rPr lang="en-US" sz="800" dirty="0" err="1" smtClean="0">
                 <a:solidFill>
                   <a:schemeClr val="tx1"/>
                 </a:solidFill>
@@ -6705,7 +6705,7 @@
               <a:t>s</a:t>
             </a:r>
             <a:r>
-              <a:rPr lang="en-US" sz="800" baseline="-25000">
+              <a:rPr lang="en-US" sz="800" baseline="-25000" dirty="0" err="1">
                 <a:solidFill>
                   <a:schemeClr val="tx1"/>
                 </a:solidFill>

</xml_diff>

<commit_message>
[monitoring_wcet] Fix node numbers for example.
</commit_message>
<xml_diff>
--- a/monitoring_wcet/figs_src/diagrams-narrow.pptx
+++ b/monitoring_wcet/figs_src/diagrams-narrow.pptx
@@ -294,7 +294,7 @@
           <a:p>
             <a:fld id="{D888532C-1FCB-40DB-A177-17AD6E59D507}" type="datetimeFigureOut">
               <a:rPr lang="en-US" smtClean="0"/>
-              <a:t>2/17/2015</a:t>
+              <a:t>2/21/2015</a:t>
             </a:fld>
             <a:endParaRPr lang="en-US"/>
           </a:p>
@@ -464,7 +464,7 @@
           <a:p>
             <a:fld id="{D888532C-1FCB-40DB-A177-17AD6E59D507}" type="datetimeFigureOut">
               <a:rPr lang="en-US" smtClean="0"/>
-              <a:t>2/17/2015</a:t>
+              <a:t>2/21/2015</a:t>
             </a:fld>
             <a:endParaRPr lang="en-US"/>
           </a:p>
@@ -644,7 +644,7 @@
           <a:p>
             <a:fld id="{D888532C-1FCB-40DB-A177-17AD6E59D507}" type="datetimeFigureOut">
               <a:rPr lang="en-US" smtClean="0"/>
-              <a:t>2/17/2015</a:t>
+              <a:t>2/21/2015</a:t>
             </a:fld>
             <a:endParaRPr lang="en-US"/>
           </a:p>
@@ -814,7 +814,7 @@
           <a:p>
             <a:fld id="{D888532C-1FCB-40DB-A177-17AD6E59D507}" type="datetimeFigureOut">
               <a:rPr lang="en-US" smtClean="0"/>
-              <a:t>2/17/2015</a:t>
+              <a:t>2/21/2015</a:t>
             </a:fld>
             <a:endParaRPr lang="en-US"/>
           </a:p>
@@ -1060,7 +1060,7 @@
           <a:p>
             <a:fld id="{D888532C-1FCB-40DB-A177-17AD6E59D507}" type="datetimeFigureOut">
               <a:rPr lang="en-US" smtClean="0"/>
-              <a:t>2/17/2015</a:t>
+              <a:t>2/21/2015</a:t>
             </a:fld>
             <a:endParaRPr lang="en-US"/>
           </a:p>
@@ -1348,7 +1348,7 @@
           <a:p>
             <a:fld id="{D888532C-1FCB-40DB-A177-17AD6E59D507}" type="datetimeFigureOut">
               <a:rPr lang="en-US" smtClean="0"/>
-              <a:t>2/17/2015</a:t>
+              <a:t>2/21/2015</a:t>
             </a:fld>
             <a:endParaRPr lang="en-US"/>
           </a:p>
@@ -1775,7 +1775,7 @@
           <a:p>
             <a:fld id="{D888532C-1FCB-40DB-A177-17AD6E59D507}" type="datetimeFigureOut">
               <a:rPr lang="en-US" smtClean="0"/>
-              <a:t>2/17/2015</a:t>
+              <a:t>2/21/2015</a:t>
             </a:fld>
             <a:endParaRPr lang="en-US"/>
           </a:p>
@@ -1893,7 +1893,7 @@
           <a:p>
             <a:fld id="{D888532C-1FCB-40DB-A177-17AD6E59D507}" type="datetimeFigureOut">
               <a:rPr lang="en-US" smtClean="0"/>
-              <a:t>2/17/2015</a:t>
+              <a:t>2/21/2015</a:t>
             </a:fld>
             <a:endParaRPr lang="en-US"/>
           </a:p>
@@ -1988,7 +1988,7 @@
           <a:p>
             <a:fld id="{D888532C-1FCB-40DB-A177-17AD6E59D507}" type="datetimeFigureOut">
               <a:rPr lang="en-US" smtClean="0"/>
-              <a:t>2/17/2015</a:t>
+              <a:t>2/21/2015</a:t>
             </a:fld>
             <a:endParaRPr lang="en-US"/>
           </a:p>
@@ -2265,7 +2265,7 @@
           <a:p>
             <a:fld id="{D888532C-1FCB-40DB-A177-17AD6E59D507}" type="datetimeFigureOut">
               <a:rPr lang="en-US" smtClean="0"/>
-              <a:t>2/17/2015</a:t>
+              <a:t>2/21/2015</a:t>
             </a:fld>
             <a:endParaRPr lang="en-US"/>
           </a:p>
@@ -2518,7 +2518,7 @@
           <a:p>
             <a:fld id="{D888532C-1FCB-40DB-A177-17AD6E59D507}" type="datetimeFigureOut">
               <a:rPr lang="en-US" smtClean="0"/>
-              <a:t>2/17/2015</a:t>
+              <a:t>2/21/2015</a:t>
             </a:fld>
             <a:endParaRPr lang="en-US"/>
           </a:p>
@@ -2731,7 +2731,7 @@
           <a:p>
             <a:fld id="{D888532C-1FCB-40DB-A177-17AD6E59D507}" type="datetimeFigureOut">
               <a:rPr lang="en-US" smtClean="0"/>
-              <a:t>2/17/2015</a:t>
+              <a:t>2/21/2015</a:t>
             </a:fld>
             <a:endParaRPr lang="en-US"/>
           </a:p>
@@ -6138,17 +6138,7 @@
                 <a:latin typeface="Arial" pitchFamily="34" charset="0"/>
                 <a:cs typeface="Arial" pitchFamily="34" charset="0"/>
               </a:rPr>
-              <a:t> </a:t>
-            </a:r>
-            <a:r>
-              <a:rPr lang="en-US" sz="800" dirty="0" smtClean="0">
-                <a:solidFill>
-                  <a:schemeClr val="tx1"/>
-                </a:solidFill>
-                <a:latin typeface="Arial" pitchFamily="34" charset="0"/>
-                <a:cs typeface="Arial" pitchFamily="34" charset="0"/>
-              </a:rPr>
-              <a:t>+ </a:t>
+              <a:t> + </a:t>
             </a:r>
             <a:r>
               <a:rPr lang="en-US" sz="800" dirty="0">
@@ -9325,7 +9315,17 @@
                 <a:latin typeface="Arial" pitchFamily="34" charset="0"/>
                 <a:cs typeface="Arial" pitchFamily="34" charset="0"/>
               </a:rPr>
-              <a:t>c0_max = 5</a:t>
+              <a:t>c0_max = </a:t>
+            </a:r>
+            <a:r>
+              <a:rPr lang="en-US" sz="800" dirty="0" smtClean="0">
+                <a:solidFill>
+                  <a:schemeClr val="tx1"/>
+                </a:solidFill>
+                <a:latin typeface="Arial" pitchFamily="34" charset="0"/>
+                <a:cs typeface="Arial" pitchFamily="34" charset="0"/>
+              </a:rPr>
+              <a:t>8</a:t>
             </a:r>
             <a:endParaRPr lang="en-US" sz="800" dirty="0">
               <a:solidFill>
@@ -9402,7 +9402,17 @@
                 <a:latin typeface="Arial" pitchFamily="34" charset="0"/>
                 <a:cs typeface="Arial" pitchFamily="34" charset="0"/>
               </a:rPr>
-              <a:t>c1_max = 4</a:t>
+              <a:t>c1_max = </a:t>
+            </a:r>
+            <a:r>
+              <a:rPr lang="en-US" sz="800" dirty="0" smtClean="0">
+                <a:solidFill>
+                  <a:schemeClr val="tx1"/>
+                </a:solidFill>
+                <a:latin typeface="Arial" pitchFamily="34" charset="0"/>
+                <a:cs typeface="Arial" pitchFamily="34" charset="0"/>
+              </a:rPr>
+              <a:t>5</a:t>
             </a:r>
             <a:endParaRPr lang="en-US" sz="800" dirty="0">
               <a:solidFill>
@@ -9479,7 +9489,17 @@
                 <a:latin typeface="Arial" pitchFamily="34" charset="0"/>
                 <a:cs typeface="Arial" pitchFamily="34" charset="0"/>
               </a:rPr>
-              <a:t>c2_max = 7</a:t>
+              <a:t>c2_max = </a:t>
+            </a:r>
+            <a:r>
+              <a:rPr lang="en-US" sz="800" dirty="0" smtClean="0">
+                <a:solidFill>
+                  <a:schemeClr val="tx1"/>
+                </a:solidFill>
+                <a:latin typeface="Arial" pitchFamily="34" charset="0"/>
+                <a:cs typeface="Arial" pitchFamily="34" charset="0"/>
+              </a:rPr>
+              <a:t>8</a:t>
             </a:r>
             <a:endParaRPr lang="en-US" sz="800" dirty="0">
               <a:solidFill>
@@ -9556,7 +9576,17 @@
                 <a:latin typeface="Arial" pitchFamily="34" charset="0"/>
                 <a:cs typeface="Arial" pitchFamily="34" charset="0"/>
               </a:rPr>
-              <a:t>c3_max = 10</a:t>
+              <a:t>c3_max = </a:t>
+            </a:r>
+            <a:r>
+              <a:rPr lang="en-US" sz="800" dirty="0">
+                <a:solidFill>
+                  <a:schemeClr val="tx1"/>
+                </a:solidFill>
+                <a:latin typeface="Arial" pitchFamily="34" charset="0"/>
+                <a:cs typeface="Arial" pitchFamily="34" charset="0"/>
+              </a:rPr>
+              <a:t>8</a:t>
             </a:r>
             <a:endParaRPr lang="en-US" sz="800" dirty="0">
               <a:solidFill>

</xml_diff>